<commit_message>
removing rogue pptx notes
</commit_message>
<xml_diff>
--- a/Lecture 3/Lecture 3.pptx
+++ b/Lecture 3/Lecture 3.pptx
@@ -208,7 +208,6 @@
 <p1510:revInfo xmlns:a="http://schemas.openxmlformats.org/drawingml/2006/main" xmlns:r="http://schemas.openxmlformats.org/officeDocument/2006/relationships" xmlns:p1510="http://schemas.microsoft.com/office/powerpoint/2015/10/main">
   <p1510:revLst>
     <p1510:client id="{353A459F-1326-E646-9951-1A5C678B88AF}" v="863" dt="2025-05-20T05:55:19.009"/>
-    <p1510:client id="{4211DB1D-9E41-C449-90FF-CA878146CA22}" v="204" dt="2025-05-20T06:47:31.940"/>
   </p1510:revLst>
 </p1510:revInfo>
 </file>
@@ -242,7 +241,7 @@
   <pc:docChgLst>
     <pc:chgData name="Sonia Tara Hegde" userId="d93a2558-a889-4521-bcb4-6ed3fce9e012" providerId="ADAL" clId="{353A459F-1326-E646-9951-1A5C678B88AF}"/>
     <pc:docChg chg="undo custSel addSld delSld modSld modSection">
-      <pc:chgData name="Sonia Tara Hegde" userId="d93a2558-a889-4521-bcb4-6ed3fce9e012" providerId="ADAL" clId="{353A459F-1326-E646-9951-1A5C678B88AF}" dt="2025-05-20T20:56:22.365" v="2799" actId="1035"/>
+      <pc:chgData name="Sonia Tara Hegde" userId="d93a2558-a889-4521-bcb4-6ed3fce9e012" providerId="ADAL" clId="{353A459F-1326-E646-9951-1A5C678B88AF}" dt="2025-05-22T04:44:44.669" v="2813" actId="20577"/>
       <pc:docMkLst>
         <pc:docMk/>
       </pc:docMkLst>
@@ -269,8 +268,8 @@
           </ac:spMkLst>
         </pc:spChg>
       </pc:sldChg>
-      <pc:sldChg chg="modSp mod">
-        <pc:chgData name="Sonia Tara Hegde" userId="d93a2558-a889-4521-bcb4-6ed3fce9e012" providerId="ADAL" clId="{353A459F-1326-E646-9951-1A5C678B88AF}" dt="2025-05-19T23:00:40.320" v="2458" actId="1036"/>
+      <pc:sldChg chg="modSp mod modNotesTx">
+        <pc:chgData name="Sonia Tara Hegde" userId="d93a2558-a889-4521-bcb4-6ed3fce9e012" providerId="ADAL" clId="{353A459F-1326-E646-9951-1A5C678B88AF}" dt="2025-05-22T04:44:23.804" v="2811" actId="20577"/>
         <pc:sldMkLst>
           <pc:docMk/>
           <pc:sldMk cId="1354356339" sldId="265"/>
@@ -284,8 +283,8 @@
           </ac:spMkLst>
         </pc:spChg>
       </pc:sldChg>
-      <pc:sldChg chg="modSp mod">
-        <pc:chgData name="Sonia Tara Hegde" userId="d93a2558-a889-4521-bcb4-6ed3fce9e012" providerId="ADAL" clId="{353A459F-1326-E646-9951-1A5C678B88AF}" dt="2025-05-19T17:58:03.110" v="2393" actId="255"/>
+      <pc:sldChg chg="modSp mod modNotesTx">
+        <pc:chgData name="Sonia Tara Hegde" userId="d93a2558-a889-4521-bcb4-6ed3fce9e012" providerId="ADAL" clId="{353A459F-1326-E646-9951-1A5C678B88AF}" dt="2025-05-22T04:44:33.387" v="2812" actId="20577"/>
         <pc:sldMkLst>
           <pc:docMk/>
           <pc:sldMk cId="40204400" sldId="267"/>
@@ -313,30 +312,6 @@
             <ac:spMk id="3" creationId="{6E4F3BB0-8E18-4F0A-7809-AAA20A88B242}"/>
           </ac:spMkLst>
         </pc:spChg>
-        <pc:cxnChg chg="add del mod">
-          <ac:chgData name="Sonia Tara Hegde" userId="d93a2558-a889-4521-bcb4-6ed3fce9e012" providerId="ADAL" clId="{353A459F-1326-E646-9951-1A5C678B88AF}" dt="2025-05-19T22:59:25.081" v="2446" actId="478"/>
-          <ac:cxnSpMkLst>
-            <pc:docMk/>
-            <pc:sldMk cId="2856764265" sldId="268"/>
-            <ac:cxnSpMk id="4" creationId="{109BAA44-2185-151B-C431-D9D0B82E75B8}"/>
-          </ac:cxnSpMkLst>
-        </pc:cxnChg>
-        <pc:cxnChg chg="add del mod">
-          <ac:chgData name="Sonia Tara Hegde" userId="d93a2558-a889-4521-bcb4-6ed3fce9e012" providerId="ADAL" clId="{353A459F-1326-E646-9951-1A5C678B88AF}" dt="2025-05-19T22:59:25.081" v="2446" actId="478"/>
-          <ac:cxnSpMkLst>
-            <pc:docMk/>
-            <pc:sldMk cId="2856764265" sldId="268"/>
-            <ac:cxnSpMk id="5" creationId="{0439F44C-E198-D78B-5E3D-494CD4F5DE7C}"/>
-          </ac:cxnSpMkLst>
-        </pc:cxnChg>
-        <pc:cxnChg chg="add del mod">
-          <ac:chgData name="Sonia Tara Hegde" userId="d93a2558-a889-4521-bcb4-6ed3fce9e012" providerId="ADAL" clId="{353A459F-1326-E646-9951-1A5C678B88AF}" dt="2025-05-19T22:59:25.081" v="2446" actId="478"/>
-          <ac:cxnSpMkLst>
-            <pc:docMk/>
-            <pc:sldMk cId="2856764265" sldId="268"/>
-            <ac:cxnSpMk id="6" creationId="{B7360427-48B9-7256-F734-23459C8FEBD7}"/>
-          </ac:cxnSpMkLst>
-        </pc:cxnChg>
       </pc:sldChg>
       <pc:sldChg chg="modSp mod">
         <pc:chgData name="Sonia Tara Hegde" userId="d93a2558-a889-4521-bcb4-6ed3fce9e012" providerId="ADAL" clId="{353A459F-1326-E646-9951-1A5C678B88AF}" dt="2025-05-19T18:04:13.135" v="2420" actId="113"/>
@@ -353,8 +328,8 @@
           </ac:spMkLst>
         </pc:spChg>
       </pc:sldChg>
-      <pc:sldChg chg="modSp mod">
-        <pc:chgData name="Sonia Tara Hegde" userId="d93a2558-a889-4521-bcb4-6ed3fce9e012" providerId="ADAL" clId="{353A459F-1326-E646-9951-1A5C678B88AF}" dt="2025-05-19T16:55:56.633" v="2" actId="1076"/>
+      <pc:sldChg chg="modSp mod modNotesTx">
+        <pc:chgData name="Sonia Tara Hegde" userId="d93a2558-a889-4521-bcb4-6ed3fce9e012" providerId="ADAL" clId="{353A459F-1326-E646-9951-1A5C678B88AF}" dt="2025-05-22T04:42:37.068" v="2800" actId="20577"/>
         <pc:sldMkLst>
           <pc:docMk/>
           <pc:sldMk cId="86817123" sldId="274"/>
@@ -399,8 +374,8 @@
           </ac:picMkLst>
         </pc:picChg>
       </pc:sldChg>
-      <pc:sldChg chg="modSp mod">
-        <pc:chgData name="Sonia Tara Hegde" userId="d93a2558-a889-4521-bcb4-6ed3fce9e012" providerId="ADAL" clId="{353A459F-1326-E646-9951-1A5C678B88AF}" dt="2025-05-19T23:01:55.297" v="2469" actId="1035"/>
+      <pc:sldChg chg="modSp mod modNotesTx">
+        <pc:chgData name="Sonia Tara Hegde" userId="d93a2558-a889-4521-bcb4-6ed3fce9e012" providerId="ADAL" clId="{353A459F-1326-E646-9951-1A5C678B88AF}" dt="2025-05-22T04:42:54.833" v="2802" actId="20577"/>
         <pc:sldMkLst>
           <pc:docMk/>
           <pc:sldMk cId="939043990" sldId="277"/>
@@ -437,8 +412,8 @@
           </ac:picMkLst>
         </pc:picChg>
       </pc:sldChg>
-      <pc:sldChg chg="modSp mod">
-        <pc:chgData name="Sonia Tara Hegde" userId="d93a2558-a889-4521-bcb4-6ed3fce9e012" providerId="ADAL" clId="{353A459F-1326-E646-9951-1A5C678B88AF}" dt="2025-05-19T23:02:41.607" v="2487" actId="1076"/>
+      <pc:sldChg chg="modSp mod modNotesTx">
+        <pc:chgData name="Sonia Tara Hegde" userId="d93a2558-a889-4521-bcb4-6ed3fce9e012" providerId="ADAL" clId="{353A459F-1326-E646-9951-1A5C678B88AF}" dt="2025-05-22T04:43:16.011" v="2803" actId="20577"/>
         <pc:sldMkLst>
           <pc:docMk/>
           <pc:sldMk cId="1455489951" sldId="279"/>
@@ -460,8 +435,8 @@
           </ac:picMkLst>
         </pc:picChg>
       </pc:sldChg>
-      <pc:sldChg chg="modSp mod">
-        <pc:chgData name="Sonia Tara Hegde" userId="d93a2558-a889-4521-bcb4-6ed3fce9e012" providerId="ADAL" clId="{353A459F-1326-E646-9951-1A5C678B88AF}" dt="2025-05-19T23:04:07.107" v="2509" actId="1035"/>
+      <pc:sldChg chg="modSp mod modNotesTx">
+        <pc:chgData name="Sonia Tara Hegde" userId="d93a2558-a889-4521-bcb4-6ed3fce9e012" providerId="ADAL" clId="{353A459F-1326-E646-9951-1A5C678B88AF}" dt="2025-05-22T04:43:31.569" v="2804" actId="20577"/>
         <pc:sldMkLst>
           <pc:docMk/>
           <pc:sldMk cId="2537672665" sldId="280"/>
@@ -499,8 +474,29 @@
           </ac:picMkLst>
         </pc:picChg>
       </pc:sldChg>
-      <pc:sldChg chg="modSp mod">
-        <pc:chgData name="Sonia Tara Hegde" userId="d93a2558-a889-4521-bcb4-6ed3fce9e012" providerId="ADAL" clId="{353A459F-1326-E646-9951-1A5C678B88AF}" dt="2025-05-19T17:56:10.486" v="2390" actId="1037"/>
+      <pc:sldChg chg="modNotesTx">
+        <pc:chgData name="Sonia Tara Hegde" userId="d93a2558-a889-4521-bcb4-6ed3fce9e012" providerId="ADAL" clId="{353A459F-1326-E646-9951-1A5C678B88AF}" dt="2025-05-22T04:43:36.412" v="2805" actId="20577"/>
+        <pc:sldMkLst>
+          <pc:docMk/>
+          <pc:sldMk cId="3414551730" sldId="281"/>
+        </pc:sldMkLst>
+      </pc:sldChg>
+      <pc:sldChg chg="modNotesTx">
+        <pc:chgData name="Sonia Tara Hegde" userId="d93a2558-a889-4521-bcb4-6ed3fce9e012" providerId="ADAL" clId="{353A459F-1326-E646-9951-1A5C678B88AF}" dt="2025-05-22T04:43:42.602" v="2806" actId="20577"/>
+        <pc:sldMkLst>
+          <pc:docMk/>
+          <pc:sldMk cId="1383688896" sldId="282"/>
+        </pc:sldMkLst>
+      </pc:sldChg>
+      <pc:sldChg chg="modNotesTx">
+        <pc:chgData name="Sonia Tara Hegde" userId="d93a2558-a889-4521-bcb4-6ed3fce9e012" providerId="ADAL" clId="{353A459F-1326-E646-9951-1A5C678B88AF}" dt="2025-05-22T04:43:50.391" v="2807" actId="20577"/>
+        <pc:sldMkLst>
+          <pc:docMk/>
+          <pc:sldMk cId="2521805494" sldId="283"/>
+        </pc:sldMkLst>
+      </pc:sldChg>
+      <pc:sldChg chg="modSp mod modNotesTx">
+        <pc:chgData name="Sonia Tara Hegde" userId="d93a2558-a889-4521-bcb4-6ed3fce9e012" providerId="ADAL" clId="{353A459F-1326-E646-9951-1A5C678B88AF}" dt="2025-05-22T04:44:16.812" v="2810" actId="20577"/>
         <pc:sldMkLst>
           <pc:docMk/>
           <pc:sldMk cId="4148897013" sldId="285"/>
@@ -520,14 +516,6 @@
           <pc:docMk/>
           <pc:sldMk cId="1743007105" sldId="289"/>
         </pc:sldMkLst>
-        <pc:spChg chg="mod">
-          <ac:chgData name="Sonia Tara Hegde" userId="d93a2558-a889-4521-bcb4-6ed3fce9e012" providerId="ADAL" clId="{353A459F-1326-E646-9951-1A5C678B88AF}" dt="2025-05-19T18:02:13.828" v="2405" actId="255"/>
-          <ac:spMkLst>
-            <pc:docMk/>
-            <pc:sldMk cId="1743007105" sldId="289"/>
-            <ac:spMk id="3" creationId="{9EC8DC62-D5EC-F954-B13D-9CA32A7E8D5B}"/>
-          </ac:spMkLst>
-        </pc:spChg>
       </pc:sldChg>
       <pc:sldChg chg="modSp mod">
         <pc:chgData name="Sonia Tara Hegde" userId="d93a2558-a889-4521-bcb4-6ed3fce9e012" providerId="ADAL" clId="{353A459F-1326-E646-9951-1A5C678B88AF}" dt="2025-05-19T18:04:45.892" v="2424" actId="20577"/>
@@ -544,8 +532,8 @@
           </ac:spMkLst>
         </pc:spChg>
       </pc:sldChg>
-      <pc:sldChg chg="modSp mod">
-        <pc:chgData name="Sonia Tara Hegde" userId="d93a2558-a889-4521-bcb4-6ed3fce9e012" providerId="ADAL" clId="{353A459F-1326-E646-9951-1A5C678B88AF}" dt="2025-05-19T18:04:56.040" v="2426" actId="113"/>
+      <pc:sldChg chg="modSp mod modNotesTx">
+        <pc:chgData name="Sonia Tara Hegde" userId="d93a2558-a889-4521-bcb4-6ed3fce9e012" providerId="ADAL" clId="{353A459F-1326-E646-9951-1A5C678B88AF}" dt="2025-05-22T04:44:44.669" v="2813" actId="20577"/>
         <pc:sldMkLst>
           <pc:docMk/>
           <pc:sldMk cId="3975271084" sldId="295"/>
@@ -559,8 +547,8 @@
           </ac:spMkLst>
         </pc:spChg>
       </pc:sldChg>
-      <pc:sldChg chg="modSp mod">
-        <pc:chgData name="Sonia Tara Hegde" userId="d93a2558-a889-4521-bcb4-6ed3fce9e012" providerId="ADAL" clId="{353A459F-1326-E646-9951-1A5C678B88AF}" dt="2025-05-19T23:02:56.126" v="2488" actId="14100"/>
+      <pc:sldChg chg="modSp mod modNotesTx">
+        <pc:chgData name="Sonia Tara Hegde" userId="d93a2558-a889-4521-bcb4-6ed3fce9e012" providerId="ADAL" clId="{353A459F-1326-E646-9951-1A5C678B88AF}" dt="2025-05-22T04:42:49.432" v="2801" actId="20577"/>
         <pc:sldMkLst>
           <pc:docMk/>
           <pc:sldMk cId="104651184" sldId="299"/>
@@ -582,8 +570,8 @@
           </ac:picMkLst>
         </pc:picChg>
       </pc:sldChg>
-      <pc:sldChg chg="addSp delSp modSp mod delAnim modAnim">
-        <pc:chgData name="Sonia Tara Hegde" userId="d93a2558-a889-4521-bcb4-6ed3fce9e012" providerId="ADAL" clId="{353A459F-1326-E646-9951-1A5C678B88AF}" dt="2025-05-20T05:55:19.009" v="2795" actId="167"/>
+      <pc:sldChg chg="addSp delSp modSp mod delAnim modAnim modNotesTx">
+        <pc:chgData name="Sonia Tara Hegde" userId="d93a2558-a889-4521-bcb4-6ed3fce9e012" providerId="ADAL" clId="{353A459F-1326-E646-9951-1A5C678B88AF}" dt="2025-05-22T04:44:05.705" v="2809" actId="20577"/>
         <pc:sldMkLst>
           <pc:docMk/>
           <pc:sldMk cId="3348940642" sldId="301"/>
@@ -596,36 +584,12 @@
             <ac:spMk id="2" creationId="{461CD3DE-81DB-7972-447F-94108818C25F}"/>
           </ac:spMkLst>
         </pc:spChg>
-        <pc:spChg chg="add del">
-          <ac:chgData name="Sonia Tara Hegde" userId="d93a2558-a889-4521-bcb4-6ed3fce9e012" providerId="ADAL" clId="{353A459F-1326-E646-9951-1A5C678B88AF}" dt="2025-05-20T05:20:30.439" v="2646" actId="478"/>
-          <ac:spMkLst>
-            <pc:docMk/>
-            <pc:sldMk cId="3348940642" sldId="301"/>
-            <ac:spMk id="3" creationId="{3E82DBA5-7220-2C18-65D6-B8983F96EBA5}"/>
-          </ac:spMkLst>
-        </pc:spChg>
         <pc:spChg chg="mod">
           <ac:chgData name="Sonia Tara Hegde" userId="d93a2558-a889-4521-bcb4-6ed3fce9e012" providerId="ADAL" clId="{353A459F-1326-E646-9951-1A5C678B88AF}" dt="2025-05-19T17:22:15.421" v="1210" actId="20577"/>
           <ac:spMkLst>
             <pc:docMk/>
             <pc:sldMk cId="3348940642" sldId="301"/>
             <ac:spMk id="5" creationId="{C23BE54B-FC8F-B195-B4F6-DC0CA563D3BC}"/>
-          </ac:spMkLst>
-        </pc:spChg>
-        <pc:spChg chg="add del">
-          <ac:chgData name="Sonia Tara Hegde" userId="d93a2558-a889-4521-bcb4-6ed3fce9e012" providerId="ADAL" clId="{353A459F-1326-E646-9951-1A5C678B88AF}" dt="2025-05-19T17:15:02.917" v="98" actId="478"/>
-          <ac:spMkLst>
-            <pc:docMk/>
-            <pc:sldMk cId="3348940642" sldId="301"/>
-            <ac:spMk id="6" creationId="{DFD76381-9889-BA98-3418-965180F55692}"/>
-          </ac:spMkLst>
-        </pc:spChg>
-        <pc:spChg chg="add mod">
-          <ac:chgData name="Sonia Tara Hegde" userId="d93a2558-a889-4521-bcb4-6ed3fce9e012" providerId="ADAL" clId="{353A459F-1326-E646-9951-1A5C678B88AF}" dt="2025-05-19T17:15:42.964" v="102" actId="2085"/>
-          <ac:spMkLst>
-            <pc:docMk/>
-            <pc:sldMk cId="3348940642" sldId="301"/>
-            <ac:spMk id="7" creationId="{D67DDB08-354C-1FDD-3911-562E45DDFB65}"/>
           </ac:spMkLst>
         </pc:spChg>
         <pc:spChg chg="mod topLvl">
@@ -636,436 +600,12 @@
             <ac:spMk id="8" creationId="{D484C5D3-FB5C-1CCE-98FE-DA85FBE67526}"/>
           </ac:spMkLst>
         </pc:spChg>
-        <pc:spChg chg="add del mod topLvl">
-          <ac:chgData name="Sonia Tara Hegde" userId="d93a2558-a889-4521-bcb4-6ed3fce9e012" providerId="ADAL" clId="{353A459F-1326-E646-9951-1A5C678B88AF}" dt="2025-05-20T05:19:58.453" v="2642" actId="478"/>
-          <ac:spMkLst>
-            <pc:docMk/>
-            <pc:sldMk cId="3348940642" sldId="301"/>
-            <ac:spMk id="9" creationId="{505BAEDC-3E75-216B-FA0E-671036E63691}"/>
-          </ac:spMkLst>
-        </pc:spChg>
-        <pc:spChg chg="add mod">
-          <ac:chgData name="Sonia Tara Hegde" userId="d93a2558-a889-4521-bcb4-6ed3fce9e012" providerId="ADAL" clId="{353A459F-1326-E646-9951-1A5C678B88AF}" dt="2025-05-19T17:16:28.173" v="201" actId="1037"/>
-          <ac:spMkLst>
-            <pc:docMk/>
-            <pc:sldMk cId="3348940642" sldId="301"/>
-            <ac:spMk id="12" creationId="{C4A86EBC-6573-9A3E-D138-0C198C7D120D}"/>
-          </ac:spMkLst>
-        </pc:spChg>
-        <pc:spChg chg="add mod">
-          <ac:chgData name="Sonia Tara Hegde" userId="d93a2558-a889-4521-bcb4-6ed3fce9e012" providerId="ADAL" clId="{353A459F-1326-E646-9951-1A5C678B88AF}" dt="2025-05-19T17:15:50.262" v="105"/>
-          <ac:spMkLst>
-            <pc:docMk/>
-            <pc:sldMk cId="3348940642" sldId="301"/>
-            <ac:spMk id="13" creationId="{0ED9AF19-BA41-D008-06BA-6E0B1416F47F}"/>
-          </ac:spMkLst>
-        </pc:spChg>
-        <pc:spChg chg="add mod topLvl">
-          <ac:chgData name="Sonia Tara Hegde" userId="d93a2558-a889-4521-bcb4-6ed3fce9e012" providerId="ADAL" clId="{353A459F-1326-E646-9951-1A5C678B88AF}" dt="2025-05-19T17:29:22.646" v="1626" actId="165"/>
-          <ac:spMkLst>
-            <pc:docMk/>
-            <pc:sldMk cId="3348940642" sldId="301"/>
-            <ac:spMk id="14" creationId="{A699761C-FD5C-BD87-AB0D-1448E3003BF2}"/>
-          </ac:spMkLst>
-        </pc:spChg>
-        <pc:spChg chg="add del mod topLvl">
-          <ac:chgData name="Sonia Tara Hegde" userId="d93a2558-a889-4521-bcb4-6ed3fce9e012" providerId="ADAL" clId="{353A459F-1326-E646-9951-1A5C678B88AF}" dt="2025-05-20T05:19:58.453" v="2642" actId="478"/>
-          <ac:spMkLst>
-            <pc:docMk/>
-            <pc:sldMk cId="3348940642" sldId="301"/>
-            <ac:spMk id="15" creationId="{8D279B5D-F172-A4EA-D3AD-8E1179EDED28}"/>
-          </ac:spMkLst>
-        </pc:spChg>
-        <pc:spChg chg="add mod topLvl">
-          <ac:chgData name="Sonia Tara Hegde" userId="d93a2558-a889-4521-bcb4-6ed3fce9e012" providerId="ADAL" clId="{353A459F-1326-E646-9951-1A5C678B88AF}" dt="2025-05-19T17:29:22.646" v="1626" actId="165"/>
-          <ac:spMkLst>
-            <pc:docMk/>
-            <pc:sldMk cId="3348940642" sldId="301"/>
-            <ac:spMk id="16" creationId="{22419E3A-C148-F949-E85D-D06AF3DB4520}"/>
-          </ac:spMkLst>
-        </pc:spChg>
-        <pc:spChg chg="add mod topLvl">
-          <ac:chgData name="Sonia Tara Hegde" userId="d93a2558-a889-4521-bcb4-6ed3fce9e012" providerId="ADAL" clId="{353A459F-1326-E646-9951-1A5C678B88AF}" dt="2025-05-19T17:29:22.646" v="1626" actId="165"/>
-          <ac:spMkLst>
-            <pc:docMk/>
-            <pc:sldMk cId="3348940642" sldId="301"/>
-            <ac:spMk id="17" creationId="{CD600ED3-29BD-B14B-C7A4-4F7AB7623385}"/>
-          </ac:spMkLst>
-        </pc:spChg>
-        <pc:spChg chg="add mod topLvl">
-          <ac:chgData name="Sonia Tara Hegde" userId="d93a2558-a889-4521-bcb4-6ed3fce9e012" providerId="ADAL" clId="{353A459F-1326-E646-9951-1A5C678B88AF}" dt="2025-05-19T17:29:22.646" v="1626" actId="165"/>
-          <ac:spMkLst>
-            <pc:docMk/>
-            <pc:sldMk cId="3348940642" sldId="301"/>
-            <ac:spMk id="18" creationId="{C47B1F80-CEA9-AE8D-EA8C-D3028A8E0E3A}"/>
-          </ac:spMkLst>
-        </pc:spChg>
-        <pc:spChg chg="add mod">
-          <ac:chgData name="Sonia Tara Hegde" userId="d93a2558-a889-4521-bcb4-6ed3fce9e012" providerId="ADAL" clId="{353A459F-1326-E646-9951-1A5C678B88AF}" dt="2025-05-19T17:16:49.576" v="289" actId="1037"/>
-          <ac:spMkLst>
-            <pc:docMk/>
-            <pc:sldMk cId="3348940642" sldId="301"/>
-            <ac:spMk id="19" creationId="{1AD505DC-7F30-A787-682F-BBCEFC81927E}"/>
-          </ac:spMkLst>
-        </pc:spChg>
-        <pc:spChg chg="add del mod">
-          <ac:chgData name="Sonia Tara Hegde" userId="d93a2558-a889-4521-bcb4-6ed3fce9e012" providerId="ADAL" clId="{353A459F-1326-E646-9951-1A5C678B88AF}" dt="2025-05-20T05:19:58.453" v="2642" actId="478"/>
-          <ac:spMkLst>
-            <pc:docMk/>
-            <pc:sldMk cId="3348940642" sldId="301"/>
-            <ac:spMk id="20" creationId="{6CD3CFC8-74BA-3F41-2E2E-EDE95566884D}"/>
-          </ac:spMkLst>
-        </pc:spChg>
-        <pc:spChg chg="add mod">
-          <ac:chgData name="Sonia Tara Hegde" userId="d93a2558-a889-4521-bcb4-6ed3fce9e012" providerId="ADAL" clId="{353A459F-1326-E646-9951-1A5C678B88AF}" dt="2025-05-19T17:17:05.432" v="345" actId="1038"/>
-          <ac:spMkLst>
-            <pc:docMk/>
-            <pc:sldMk cId="3348940642" sldId="301"/>
-            <ac:spMk id="21" creationId="{5E4DD20E-FE87-17E9-1400-A1536D3F5CEB}"/>
-          </ac:spMkLst>
-        </pc:spChg>
-        <pc:spChg chg="add mod">
-          <ac:chgData name="Sonia Tara Hegde" userId="d93a2558-a889-4521-bcb4-6ed3fce9e012" providerId="ADAL" clId="{353A459F-1326-E646-9951-1A5C678B88AF}" dt="2025-05-19T17:17:07.846" v="350" actId="1036"/>
-          <ac:spMkLst>
-            <pc:docMk/>
-            <pc:sldMk cId="3348940642" sldId="301"/>
-            <ac:spMk id="22" creationId="{46CD29BF-581E-06EA-6BDF-F0162A1EE866}"/>
-          </ac:spMkLst>
-        </pc:spChg>
-        <pc:spChg chg="add mod">
-          <ac:chgData name="Sonia Tara Hegde" userId="d93a2558-a889-4521-bcb4-6ed3fce9e012" providerId="ADAL" clId="{353A459F-1326-E646-9951-1A5C678B88AF}" dt="2025-05-19T17:17:15.453" v="386" actId="1037"/>
-          <ac:spMkLst>
-            <pc:docMk/>
-            <pc:sldMk cId="3348940642" sldId="301"/>
-            <ac:spMk id="23" creationId="{0E29EE00-6C93-6829-6A46-F907CED05E21}"/>
-          </ac:spMkLst>
-        </pc:spChg>
-        <pc:spChg chg="add mod">
-          <ac:chgData name="Sonia Tara Hegde" userId="d93a2558-a889-4521-bcb4-6ed3fce9e012" providerId="ADAL" clId="{353A459F-1326-E646-9951-1A5C678B88AF}" dt="2025-05-19T17:17:20.300" v="405" actId="1035"/>
-          <ac:spMkLst>
-            <pc:docMk/>
-            <pc:sldMk cId="3348940642" sldId="301"/>
-            <ac:spMk id="24" creationId="{47A1B317-5181-68F8-F50C-791A311578C6}"/>
-          </ac:spMkLst>
-        </pc:spChg>
-        <pc:spChg chg="add mod">
-          <ac:chgData name="Sonia Tara Hegde" userId="d93a2558-a889-4521-bcb4-6ed3fce9e012" providerId="ADAL" clId="{353A459F-1326-E646-9951-1A5C678B88AF}" dt="2025-05-19T17:17:25.979" v="433" actId="1037"/>
-          <ac:spMkLst>
-            <pc:docMk/>
-            <pc:sldMk cId="3348940642" sldId="301"/>
-            <ac:spMk id="25" creationId="{B9BA717E-72C1-885E-BDE9-1604E9C7021F}"/>
-          </ac:spMkLst>
-        </pc:spChg>
-        <pc:spChg chg="add del mod">
-          <ac:chgData name="Sonia Tara Hegde" userId="d93a2558-a889-4521-bcb4-6ed3fce9e012" providerId="ADAL" clId="{353A459F-1326-E646-9951-1A5C678B88AF}" dt="2025-05-19T17:17:49.218" v="486" actId="478"/>
-          <ac:spMkLst>
-            <pc:docMk/>
-            <pc:sldMk cId="3348940642" sldId="301"/>
-            <ac:spMk id="26" creationId="{AC310A92-3423-3F03-CA6F-52818F1DC070}"/>
-          </ac:spMkLst>
-        </pc:spChg>
-        <pc:spChg chg="add del mod">
-          <ac:chgData name="Sonia Tara Hegde" userId="d93a2558-a889-4521-bcb4-6ed3fce9e012" providerId="ADAL" clId="{353A459F-1326-E646-9951-1A5C678B88AF}" dt="2025-05-20T05:54:00.924" v="2791" actId="478"/>
-          <ac:spMkLst>
-            <pc:docMk/>
-            <pc:sldMk cId="3348940642" sldId="301"/>
-            <ac:spMk id="27" creationId="{D302E3C3-2B24-9229-F034-E67ED289135A}"/>
-          </ac:spMkLst>
-        </pc:spChg>
-        <pc:spChg chg="add mod topLvl">
-          <ac:chgData name="Sonia Tara Hegde" userId="d93a2558-a889-4521-bcb4-6ed3fce9e012" providerId="ADAL" clId="{353A459F-1326-E646-9951-1A5C678B88AF}" dt="2025-05-19T17:29:22.646" v="1626" actId="165"/>
-          <ac:spMkLst>
-            <pc:docMk/>
-            <pc:sldMk cId="3348940642" sldId="301"/>
-            <ac:spMk id="28" creationId="{A54E65CE-9459-995F-8E9E-BECC8EBDB9D0}"/>
-          </ac:spMkLst>
-        </pc:spChg>
-        <pc:spChg chg="add del mod topLvl">
-          <ac:chgData name="Sonia Tara Hegde" userId="d93a2558-a889-4521-bcb4-6ed3fce9e012" providerId="ADAL" clId="{353A459F-1326-E646-9951-1A5C678B88AF}" dt="2025-05-20T05:19:58.453" v="2642" actId="478"/>
-          <ac:spMkLst>
-            <pc:docMk/>
-            <pc:sldMk cId="3348940642" sldId="301"/>
-            <ac:spMk id="29" creationId="{CC277069-81EE-664B-40F6-B812D7B8DE97}"/>
-          </ac:spMkLst>
-        </pc:spChg>
-        <pc:spChg chg="add del mod topLvl">
-          <ac:chgData name="Sonia Tara Hegde" userId="d93a2558-a889-4521-bcb4-6ed3fce9e012" providerId="ADAL" clId="{353A459F-1326-E646-9951-1A5C678B88AF}" dt="2025-05-20T05:19:58.453" v="2642" actId="478"/>
-          <ac:spMkLst>
-            <pc:docMk/>
-            <pc:sldMk cId="3348940642" sldId="301"/>
-            <ac:spMk id="30" creationId="{7A5407DE-69DD-928C-B8B2-7DE4A9C34C50}"/>
-          </ac:spMkLst>
-        </pc:spChg>
-        <pc:spChg chg="add del mod topLvl">
-          <ac:chgData name="Sonia Tara Hegde" userId="d93a2558-a889-4521-bcb4-6ed3fce9e012" providerId="ADAL" clId="{353A459F-1326-E646-9951-1A5C678B88AF}" dt="2025-05-20T05:19:58.453" v="2642" actId="478"/>
-          <ac:spMkLst>
-            <pc:docMk/>
-            <pc:sldMk cId="3348940642" sldId="301"/>
-            <ac:spMk id="31" creationId="{743DD694-49F7-3478-5849-9FD748ECBCA3}"/>
-          </ac:spMkLst>
-        </pc:spChg>
-        <pc:spChg chg="add mod">
-          <ac:chgData name="Sonia Tara Hegde" userId="d93a2558-a889-4521-bcb4-6ed3fce9e012" providerId="ADAL" clId="{353A459F-1326-E646-9951-1A5C678B88AF}" dt="2025-05-19T17:20:00.810" v="666" actId="1035"/>
-          <ac:spMkLst>
-            <pc:docMk/>
-            <pc:sldMk cId="3348940642" sldId="301"/>
-            <ac:spMk id="32" creationId="{DE381DF6-0E13-ADFA-D398-B466AA8E2C33}"/>
-          </ac:spMkLst>
-        </pc:spChg>
-        <pc:spChg chg="add del mod topLvl">
-          <ac:chgData name="Sonia Tara Hegde" userId="d93a2558-a889-4521-bcb4-6ed3fce9e012" providerId="ADAL" clId="{353A459F-1326-E646-9951-1A5C678B88AF}" dt="2025-05-20T05:19:58.453" v="2642" actId="478"/>
-          <ac:spMkLst>
-            <pc:docMk/>
-            <pc:sldMk cId="3348940642" sldId="301"/>
-            <ac:spMk id="33" creationId="{8303DC71-D717-D3D8-0447-AEE5A482D108}"/>
-          </ac:spMkLst>
-        </pc:spChg>
-        <pc:spChg chg="add del mod topLvl">
-          <ac:chgData name="Sonia Tara Hegde" userId="d93a2558-a889-4521-bcb4-6ed3fce9e012" providerId="ADAL" clId="{353A459F-1326-E646-9951-1A5C678B88AF}" dt="2025-05-20T05:19:58.453" v="2642" actId="478"/>
-          <ac:spMkLst>
-            <pc:docMk/>
-            <pc:sldMk cId="3348940642" sldId="301"/>
-            <ac:spMk id="34" creationId="{A52F30F8-4C21-8633-5E85-7648D7AB0546}"/>
-          </ac:spMkLst>
-        </pc:spChg>
-        <pc:spChg chg="add mod">
-          <ac:chgData name="Sonia Tara Hegde" userId="d93a2558-a889-4521-bcb4-6ed3fce9e012" providerId="ADAL" clId="{353A459F-1326-E646-9951-1A5C678B88AF}" dt="2025-05-19T17:20:14.589" v="746" actId="1037"/>
-          <ac:spMkLst>
-            <pc:docMk/>
-            <pc:sldMk cId="3348940642" sldId="301"/>
-            <ac:spMk id="35" creationId="{5076E683-B587-703C-A712-74B762AC8E60}"/>
-          </ac:spMkLst>
-        </pc:spChg>
-        <pc:spChg chg="add mod">
-          <ac:chgData name="Sonia Tara Hegde" userId="d93a2558-a889-4521-bcb4-6ed3fce9e012" providerId="ADAL" clId="{353A459F-1326-E646-9951-1A5C678B88AF}" dt="2025-05-19T17:20:17.680" v="765" actId="1035"/>
-          <ac:spMkLst>
-            <pc:docMk/>
-            <pc:sldMk cId="3348940642" sldId="301"/>
-            <ac:spMk id="36" creationId="{3D0A84FD-E49D-FFBE-212F-F2C5821A6A83}"/>
-          </ac:spMkLst>
-        </pc:spChg>
-        <pc:spChg chg="add mod">
-          <ac:chgData name="Sonia Tara Hegde" userId="d93a2558-a889-4521-bcb4-6ed3fce9e012" providerId="ADAL" clId="{353A459F-1326-E646-9951-1A5C678B88AF}" dt="2025-05-19T17:20:21.837" v="787" actId="1037"/>
-          <ac:spMkLst>
-            <pc:docMk/>
-            <pc:sldMk cId="3348940642" sldId="301"/>
-            <ac:spMk id="37" creationId="{B99C5F74-5AAC-9966-7B42-54A202DF645C}"/>
-          </ac:spMkLst>
-        </pc:spChg>
-        <pc:spChg chg="add mod">
-          <ac:chgData name="Sonia Tara Hegde" userId="d93a2558-a889-4521-bcb4-6ed3fce9e012" providerId="ADAL" clId="{353A459F-1326-E646-9951-1A5C678B88AF}" dt="2025-05-19T17:20:25.364" v="809" actId="1035"/>
-          <ac:spMkLst>
-            <pc:docMk/>
-            <pc:sldMk cId="3348940642" sldId="301"/>
-            <ac:spMk id="38" creationId="{21C2A0F1-A575-257F-359D-D3569BBEE6C0}"/>
-          </ac:spMkLst>
-        </pc:spChg>
-        <pc:spChg chg="add mod topLvl">
-          <ac:chgData name="Sonia Tara Hegde" userId="d93a2558-a889-4521-bcb4-6ed3fce9e012" providerId="ADAL" clId="{353A459F-1326-E646-9951-1A5C678B88AF}" dt="2025-05-20T05:19:28.281" v="2637" actId="1037"/>
-          <ac:spMkLst>
-            <pc:docMk/>
-            <pc:sldMk cId="3348940642" sldId="301"/>
-            <ac:spMk id="39" creationId="{0D544337-4441-1856-9042-124B93972FD0}"/>
-          </ac:spMkLst>
-        </pc:spChg>
-        <pc:spChg chg="add mod">
-          <ac:chgData name="Sonia Tara Hegde" userId="d93a2558-a889-4521-bcb4-6ed3fce9e012" providerId="ADAL" clId="{353A459F-1326-E646-9951-1A5C678B88AF}" dt="2025-05-19T17:20:32.993" v="845" actId="1035"/>
-          <ac:spMkLst>
-            <pc:docMk/>
-            <pc:sldMk cId="3348940642" sldId="301"/>
-            <ac:spMk id="40" creationId="{E4C571DB-2065-615B-C4C5-3DCD5FA3C111}"/>
-          </ac:spMkLst>
-        </pc:spChg>
-        <pc:spChg chg="add mod">
-          <ac:chgData name="Sonia Tara Hegde" userId="d93a2558-a889-4521-bcb4-6ed3fce9e012" providerId="ADAL" clId="{353A459F-1326-E646-9951-1A5C678B88AF}" dt="2025-05-19T17:20:36.351" v="861" actId="1035"/>
-          <ac:spMkLst>
-            <pc:docMk/>
-            <pc:sldMk cId="3348940642" sldId="301"/>
-            <ac:spMk id="41" creationId="{CB02AC86-63B2-54D3-7065-8B3AAF105465}"/>
-          </ac:spMkLst>
-        </pc:spChg>
-        <pc:spChg chg="add mod topLvl">
-          <ac:chgData name="Sonia Tara Hegde" userId="d93a2558-a889-4521-bcb4-6ed3fce9e012" providerId="ADAL" clId="{353A459F-1326-E646-9951-1A5C678B88AF}" dt="2025-05-19T17:29:22.646" v="1626" actId="165"/>
-          <ac:spMkLst>
-            <pc:docMk/>
-            <pc:sldMk cId="3348940642" sldId="301"/>
-            <ac:spMk id="42" creationId="{C8B33EFE-FD58-CE0B-8180-E726C7B9CF17}"/>
-          </ac:spMkLst>
-        </pc:spChg>
-        <pc:spChg chg="add del mod topLvl">
-          <ac:chgData name="Sonia Tara Hegde" userId="d93a2558-a889-4521-bcb4-6ed3fce9e012" providerId="ADAL" clId="{353A459F-1326-E646-9951-1A5C678B88AF}" dt="2025-05-20T05:20:03.992" v="2643" actId="478"/>
-          <ac:spMkLst>
-            <pc:docMk/>
-            <pc:sldMk cId="3348940642" sldId="301"/>
-            <ac:spMk id="43" creationId="{C2B9D873-C3A8-4ABE-30B1-26152F91CEEA}"/>
-          </ac:spMkLst>
-        </pc:spChg>
-        <pc:spChg chg="add mod topLvl">
-          <ac:chgData name="Sonia Tara Hegde" userId="d93a2558-a889-4521-bcb4-6ed3fce9e012" providerId="ADAL" clId="{353A459F-1326-E646-9951-1A5C678B88AF}" dt="2025-05-19T17:29:22.646" v="1626" actId="165"/>
-          <ac:spMkLst>
-            <pc:docMk/>
-            <pc:sldMk cId="3348940642" sldId="301"/>
-            <ac:spMk id="44" creationId="{B52C0FE0-A2C9-00F2-324F-A7FA3DDC1F8D}"/>
-          </ac:spMkLst>
-        </pc:spChg>
-        <pc:spChg chg="add mod">
-          <ac:chgData name="Sonia Tara Hegde" userId="d93a2558-a889-4521-bcb4-6ed3fce9e012" providerId="ADAL" clId="{353A459F-1326-E646-9951-1A5C678B88AF}" dt="2025-05-19T17:20:53.727" v="952" actId="1037"/>
-          <ac:spMkLst>
-            <pc:docMk/>
-            <pc:sldMk cId="3348940642" sldId="301"/>
-            <ac:spMk id="45" creationId="{2522DBC8-0BE5-8E05-9AE8-12E956E879A7}"/>
-          </ac:spMkLst>
-        </pc:spChg>
-        <pc:spChg chg="add mod">
-          <ac:chgData name="Sonia Tara Hegde" userId="d93a2558-a889-4521-bcb4-6ed3fce9e012" providerId="ADAL" clId="{353A459F-1326-E646-9951-1A5C678B88AF}" dt="2025-05-19T17:21:02.184" v="984" actId="20577"/>
-          <ac:spMkLst>
-            <pc:docMk/>
-            <pc:sldMk cId="3348940642" sldId="301"/>
-            <ac:spMk id="46" creationId="{9E29EB33-330B-444C-B094-FF2B14B7A1F5}"/>
-          </ac:spMkLst>
-        </pc:spChg>
-        <pc:spChg chg="add mod">
-          <ac:chgData name="Sonia Tara Hegde" userId="d93a2558-a889-4521-bcb4-6ed3fce9e012" providerId="ADAL" clId="{353A459F-1326-E646-9951-1A5C678B88AF}" dt="2025-05-19T17:21:00.520" v="983"/>
-          <ac:spMkLst>
-            <pc:docMk/>
-            <pc:sldMk cId="3348940642" sldId="301"/>
-            <ac:spMk id="47" creationId="{5F104D7A-9E17-DC28-75B8-6689B5EC3C7A}"/>
-          </ac:spMkLst>
-        </pc:spChg>
-        <pc:spChg chg="add mod">
-          <ac:chgData name="Sonia Tara Hegde" userId="d93a2558-a889-4521-bcb4-6ed3fce9e012" providerId="ADAL" clId="{353A459F-1326-E646-9951-1A5C678B88AF}" dt="2025-05-19T17:21:11.357" v="1019" actId="1038"/>
-          <ac:spMkLst>
-            <pc:docMk/>
-            <pc:sldMk cId="3348940642" sldId="301"/>
-            <ac:spMk id="48" creationId="{A35CEA48-D9FE-EDD9-D471-1092F8867C2B}"/>
-          </ac:spMkLst>
-        </pc:spChg>
-        <pc:spChg chg="add del mod topLvl">
-          <ac:chgData name="Sonia Tara Hegde" userId="d93a2558-a889-4521-bcb4-6ed3fce9e012" providerId="ADAL" clId="{353A459F-1326-E646-9951-1A5C678B88AF}" dt="2025-05-20T05:19:58.453" v="2642" actId="478"/>
-          <ac:spMkLst>
-            <pc:docMk/>
-            <pc:sldMk cId="3348940642" sldId="301"/>
-            <ac:spMk id="49" creationId="{DF6CEA17-9CB9-6258-CFAC-B45861EF3080}"/>
-          </ac:spMkLst>
-        </pc:spChg>
-        <pc:spChg chg="add mod">
-          <ac:chgData name="Sonia Tara Hegde" userId="d93a2558-a889-4521-bcb4-6ed3fce9e012" providerId="ADAL" clId="{353A459F-1326-E646-9951-1A5C678B88AF}" dt="2025-05-19T17:21:24.842" v="1103" actId="1035"/>
-          <ac:spMkLst>
-            <pc:docMk/>
-            <pc:sldMk cId="3348940642" sldId="301"/>
-            <ac:spMk id="50" creationId="{649DC735-87D0-7BCF-169C-0D831B128A0F}"/>
-          </ac:spMkLst>
-        </pc:spChg>
-        <pc:spChg chg="add del mod">
-          <ac:chgData name="Sonia Tara Hegde" userId="d93a2558-a889-4521-bcb4-6ed3fce9e012" providerId="ADAL" clId="{353A459F-1326-E646-9951-1A5C678B88AF}" dt="2025-05-20T05:20:03.992" v="2643" actId="478"/>
-          <ac:spMkLst>
-            <pc:docMk/>
-            <pc:sldMk cId="3348940642" sldId="301"/>
-            <ac:spMk id="51" creationId="{B5BE8058-A840-0054-623B-98BD480D2BAC}"/>
-          </ac:spMkLst>
-        </pc:spChg>
-        <pc:spChg chg="add del mod topLvl">
-          <ac:chgData name="Sonia Tara Hegde" userId="d93a2558-a889-4521-bcb4-6ed3fce9e012" providerId="ADAL" clId="{353A459F-1326-E646-9951-1A5C678B88AF}" dt="2025-05-20T05:20:03.992" v="2643" actId="478"/>
-          <ac:spMkLst>
-            <pc:docMk/>
-            <pc:sldMk cId="3348940642" sldId="301"/>
-            <ac:spMk id="52" creationId="{4D5DF1DF-4BD6-2571-3D9E-CD52F50B9191}"/>
-          </ac:spMkLst>
-        </pc:spChg>
         <pc:spChg chg="add mod topLvl">
           <ac:chgData name="Sonia Tara Hegde" userId="d93a2558-a889-4521-bcb4-6ed3fce9e012" providerId="ADAL" clId="{353A459F-1326-E646-9951-1A5C678B88AF}" dt="2025-05-20T05:47:33.416" v="2776" actId="1037"/>
           <ac:spMkLst>
             <pc:docMk/>
             <pc:sldMk cId="3348940642" sldId="301"/>
             <ac:spMk id="59" creationId="{FDAD1F23-558D-342D-6508-CB3559EDAD7A}"/>
-          </ac:spMkLst>
-        </pc:spChg>
-        <pc:spChg chg="add del">
-          <ac:chgData name="Sonia Tara Hegde" userId="d93a2558-a889-4521-bcb4-6ed3fce9e012" providerId="ADAL" clId="{353A459F-1326-E646-9951-1A5C678B88AF}" dt="2025-05-20T05:36:49.801" v="2671" actId="478"/>
-          <ac:spMkLst>
-            <pc:docMk/>
-            <pc:sldMk cId="3348940642" sldId="301"/>
-            <ac:spMk id="61" creationId="{D33727FD-C211-663F-1893-3693B5079796}"/>
-          </ac:spMkLst>
-        </pc:spChg>
-        <pc:spChg chg="add mod topLvl">
-          <ac:chgData name="Sonia Tara Hegde" userId="d93a2558-a889-4521-bcb4-6ed3fce9e012" providerId="ADAL" clId="{353A459F-1326-E646-9951-1A5C678B88AF}" dt="2025-05-19T17:29:16.300" v="1625" actId="165"/>
-          <ac:spMkLst>
-            <pc:docMk/>
-            <pc:sldMk cId="3348940642" sldId="301"/>
-            <ac:spMk id="62" creationId="{FB0A0451-B2E9-2946-E177-FC647AC8EB1F}"/>
-          </ac:spMkLst>
-        </pc:spChg>
-        <pc:spChg chg="add del mod topLvl">
-          <ac:chgData name="Sonia Tara Hegde" userId="d93a2558-a889-4521-bcb4-6ed3fce9e012" providerId="ADAL" clId="{353A459F-1326-E646-9951-1A5C678B88AF}" dt="2025-05-20T05:19:58.453" v="2642" actId="478"/>
-          <ac:spMkLst>
-            <pc:docMk/>
-            <pc:sldMk cId="3348940642" sldId="301"/>
-            <ac:spMk id="63" creationId="{1B710CA5-BBFD-66B7-325F-328CF6853EDC}"/>
-          </ac:spMkLst>
-        </pc:spChg>
-        <pc:spChg chg="add mod topLvl">
-          <ac:chgData name="Sonia Tara Hegde" userId="d93a2558-a889-4521-bcb4-6ed3fce9e012" providerId="ADAL" clId="{353A459F-1326-E646-9951-1A5C678B88AF}" dt="2025-05-19T17:29:16.300" v="1625" actId="165"/>
-          <ac:spMkLst>
-            <pc:docMk/>
-            <pc:sldMk cId="3348940642" sldId="301"/>
-            <ac:spMk id="64" creationId="{86971694-7A2E-7A5C-FC57-EFA883189B3D}"/>
-          </ac:spMkLst>
-        </pc:spChg>
-        <pc:spChg chg="add mod topLvl">
-          <ac:chgData name="Sonia Tara Hegde" userId="d93a2558-a889-4521-bcb4-6ed3fce9e012" providerId="ADAL" clId="{353A459F-1326-E646-9951-1A5C678B88AF}" dt="2025-05-19T17:29:16.300" v="1625" actId="165"/>
-          <ac:spMkLst>
-            <pc:docMk/>
-            <pc:sldMk cId="3348940642" sldId="301"/>
-            <ac:spMk id="65" creationId="{A061BCFF-C76C-DD47-BB3B-27849F0ED5FF}"/>
-          </ac:spMkLst>
-        </pc:spChg>
-        <pc:spChg chg="add del mod topLvl">
-          <ac:chgData name="Sonia Tara Hegde" userId="d93a2558-a889-4521-bcb4-6ed3fce9e012" providerId="ADAL" clId="{353A459F-1326-E646-9951-1A5C678B88AF}" dt="2025-05-20T05:20:03.992" v="2643" actId="478"/>
-          <ac:spMkLst>
-            <pc:docMk/>
-            <pc:sldMk cId="3348940642" sldId="301"/>
-            <ac:spMk id="66" creationId="{B8BFEA9D-5686-A0C5-1795-6EDC287054E7}"/>
-          </ac:spMkLst>
-        </pc:spChg>
-        <pc:spChg chg="add del mod topLvl">
-          <ac:chgData name="Sonia Tara Hegde" userId="d93a2558-a889-4521-bcb4-6ed3fce9e012" providerId="ADAL" clId="{353A459F-1326-E646-9951-1A5C678B88AF}" dt="2025-05-20T05:20:03.992" v="2643" actId="478"/>
-          <ac:spMkLst>
-            <pc:docMk/>
-            <pc:sldMk cId="3348940642" sldId="301"/>
-            <ac:spMk id="67" creationId="{1E829EFC-0FA7-E1D5-486F-7F1150ED2A57}"/>
-          </ac:spMkLst>
-        </pc:spChg>
-        <pc:spChg chg="add del mod topLvl">
-          <ac:chgData name="Sonia Tara Hegde" userId="d93a2558-a889-4521-bcb4-6ed3fce9e012" providerId="ADAL" clId="{353A459F-1326-E646-9951-1A5C678B88AF}" dt="2025-05-20T05:20:03.992" v="2643" actId="478"/>
-          <ac:spMkLst>
-            <pc:docMk/>
-            <pc:sldMk cId="3348940642" sldId="301"/>
-            <ac:spMk id="68" creationId="{50857B3A-1A8A-5914-66F1-62517418A807}"/>
-          </ac:spMkLst>
-        </pc:spChg>
-        <pc:spChg chg="add del mod topLvl">
-          <ac:chgData name="Sonia Tara Hegde" userId="d93a2558-a889-4521-bcb4-6ed3fce9e012" providerId="ADAL" clId="{353A459F-1326-E646-9951-1A5C678B88AF}" dt="2025-05-20T05:20:03.992" v="2643" actId="478"/>
-          <ac:spMkLst>
-            <pc:docMk/>
-            <pc:sldMk cId="3348940642" sldId="301"/>
-            <ac:spMk id="69" creationId="{4DC5922B-FCBD-1823-1B99-440C57FECA6B}"/>
-          </ac:spMkLst>
-        </pc:spChg>
-        <pc:spChg chg="add mod topLvl">
-          <ac:chgData name="Sonia Tara Hegde" userId="d93a2558-a889-4521-bcb4-6ed3fce9e012" providerId="ADAL" clId="{353A459F-1326-E646-9951-1A5C678B88AF}" dt="2025-05-19T17:29:16.300" v="1625" actId="165"/>
-          <ac:spMkLst>
-            <pc:docMk/>
-            <pc:sldMk cId="3348940642" sldId="301"/>
-            <ac:spMk id="70" creationId="{49C13603-D4C5-9F9A-6EBE-79F70F8C15D9}"/>
-          </ac:spMkLst>
-        </pc:spChg>
-        <pc:spChg chg="add del mod topLvl">
-          <ac:chgData name="Sonia Tara Hegde" userId="d93a2558-a889-4521-bcb4-6ed3fce9e012" providerId="ADAL" clId="{353A459F-1326-E646-9951-1A5C678B88AF}" dt="2025-05-20T05:47:51.666" v="2778" actId="478"/>
-          <ac:spMkLst>
-            <pc:docMk/>
-            <pc:sldMk cId="3348940642" sldId="301"/>
-            <ac:spMk id="73" creationId="{9C67109C-1C52-AEA4-171E-5C49595579A7}"/>
           </ac:spMkLst>
         </pc:spChg>
         <pc:spChg chg="add mod">
@@ -1084,46 +624,6 @@
             <ac:spMk id="76" creationId="{AD945688-2E99-C028-71D8-53FD4D8F79F0}"/>
           </ac:spMkLst>
         </pc:spChg>
-        <pc:grpChg chg="del">
-          <ac:chgData name="Sonia Tara Hegde" userId="d93a2558-a889-4521-bcb4-6ed3fce9e012" providerId="ADAL" clId="{353A459F-1326-E646-9951-1A5C678B88AF}" dt="2025-05-19T17:04:31.570" v="5" actId="165"/>
-          <ac:grpSpMkLst>
-            <pc:docMk/>
-            <pc:sldMk cId="3348940642" sldId="301"/>
-            <ac:grpSpMk id="11" creationId="{DB33CC2F-9F33-E694-D27E-1609F321687A}"/>
-          </ac:grpSpMkLst>
-        </pc:grpChg>
-        <pc:grpChg chg="add topLvl">
-          <ac:chgData name="Sonia Tara Hegde" userId="d93a2558-a889-4521-bcb4-6ed3fce9e012" providerId="ADAL" clId="{353A459F-1326-E646-9951-1A5C678B88AF}" dt="2025-05-19T17:29:16.300" v="1625" actId="165"/>
-          <ac:grpSpMkLst>
-            <pc:docMk/>
-            <pc:sldMk cId="3348940642" sldId="301"/>
-            <ac:grpSpMk id="56" creationId="{4F9928CF-CBFD-D995-F2A1-8A93BB7FA05F}"/>
-          </ac:grpSpMkLst>
-        </pc:grpChg>
-        <pc:grpChg chg="add mod topLvl">
-          <ac:chgData name="Sonia Tara Hegde" userId="d93a2558-a889-4521-bcb4-6ed3fce9e012" providerId="ADAL" clId="{353A459F-1326-E646-9951-1A5C678B88AF}" dt="2025-05-19T17:29:04.658" v="1624" actId="165"/>
-          <ac:grpSpMkLst>
-            <pc:docMk/>
-            <pc:sldMk cId="3348940642" sldId="301"/>
-            <ac:grpSpMk id="71" creationId="{B7384015-F8D5-9E36-3C66-60924D2B2A40}"/>
-          </ac:grpSpMkLst>
-        </pc:grpChg>
-        <pc:grpChg chg="add del">
-          <ac:chgData name="Sonia Tara Hegde" userId="d93a2558-a889-4521-bcb4-6ed3fce9e012" providerId="ADAL" clId="{353A459F-1326-E646-9951-1A5C678B88AF}" dt="2025-05-19T17:29:04.658" v="1624" actId="165"/>
-          <ac:grpSpMkLst>
-            <pc:docMk/>
-            <pc:sldMk cId="3348940642" sldId="301"/>
-            <ac:grpSpMk id="74" creationId="{5F3E1DB4-7782-0D07-3D53-49842D05E7DD}"/>
-          </ac:grpSpMkLst>
-        </pc:grpChg>
-        <pc:grpChg chg="add mod">
-          <ac:chgData name="Sonia Tara Hegde" userId="d93a2558-a889-4521-bcb4-6ed3fce9e012" providerId="ADAL" clId="{353A459F-1326-E646-9951-1A5C678B88AF}" dt="2025-05-20T05:18:30.052" v="2628" actId="1076"/>
-          <ac:grpSpMkLst>
-            <pc:docMk/>
-            <pc:sldMk cId="3348940642" sldId="301"/>
-            <ac:grpSpMk id="75" creationId="{8DC042CD-0541-A5A3-0CD1-AA91D19C0BC0}"/>
-          </ac:grpSpMkLst>
-        </pc:grpChg>
         <pc:grpChg chg="add mod">
           <ac:chgData name="Sonia Tara Hegde" userId="d93a2558-a889-4521-bcb4-6ed3fce9e012" providerId="ADAL" clId="{353A459F-1326-E646-9951-1A5C678B88AF}" dt="2025-05-20T05:43:49.608" v="2741" actId="1076"/>
           <ac:grpSpMkLst>
@@ -1140,14 +640,6 @@
             <ac:picMk id="10" creationId="{619C312E-E836-27F6-18DE-EB7356F07FFF}"/>
           </ac:picMkLst>
         </pc:picChg>
-        <pc:picChg chg="add del mod modCrop">
-          <ac:chgData name="Sonia Tara Hegde" userId="d93a2558-a889-4521-bcb4-6ed3fce9e012" providerId="ADAL" clId="{353A459F-1326-E646-9951-1A5C678B88AF}" dt="2025-05-20T05:42:59.306" v="2732" actId="478"/>
-          <ac:picMkLst>
-            <pc:docMk/>
-            <pc:sldMk cId="3348940642" sldId="301"/>
-            <ac:picMk id="58" creationId="{E745C27E-4B96-67B0-1BE3-7541D2F0B91E}"/>
-          </ac:picMkLst>
-        </pc:picChg>
         <pc:picChg chg="add mod modCrop">
           <ac:chgData name="Sonia Tara Hegde" userId="d93a2558-a889-4521-bcb4-6ed3fce9e012" providerId="ADAL" clId="{353A459F-1326-E646-9951-1A5C678B88AF}" dt="2025-05-20T05:55:19.009" v="2795" actId="167"/>
           <ac:picMkLst>
@@ -1162,14 +654,6 @@
             <pc:docMk/>
             <pc:sldMk cId="3348940642" sldId="301"/>
             <ac:cxnSpMk id="4" creationId="{62C1F8CC-C2D5-2A49-BBC9-B8A065336FDD}"/>
-          </ac:cxnSpMkLst>
-        </pc:cxnChg>
-        <pc:cxnChg chg="add del mod">
-          <ac:chgData name="Sonia Tara Hegde" userId="d93a2558-a889-4521-bcb4-6ed3fce9e012" providerId="ADAL" clId="{353A459F-1326-E646-9951-1A5C678B88AF}" dt="2025-05-20T05:21:19.937" v="2655" actId="478"/>
-          <ac:cxnSpMkLst>
-            <pc:docMk/>
-            <pc:sldMk cId="3348940642" sldId="301"/>
-            <ac:cxnSpMk id="11" creationId="{9D830F8B-C614-542B-2471-E02CE6C17F40}"/>
           </ac:cxnSpMkLst>
         </pc:cxnChg>
         <pc:cxnChg chg="add mod topLvl">
@@ -1204,14 +688,6 @@
             <ac:cxnSpMk id="77" creationId="{674C072D-1983-2E0B-EF86-DFDF4781D8CC}"/>
           </ac:cxnSpMkLst>
         </pc:cxnChg>
-        <pc:cxnChg chg="add del mod">
-          <ac:chgData name="Sonia Tara Hegde" userId="d93a2558-a889-4521-bcb4-6ed3fce9e012" providerId="ADAL" clId="{353A459F-1326-E646-9951-1A5C678B88AF}" dt="2025-05-20T05:48:46.010" v="2786" actId="478"/>
-          <ac:cxnSpMkLst>
-            <pc:docMk/>
-            <pc:sldMk cId="3348940642" sldId="301"/>
-            <ac:cxnSpMk id="79" creationId="{4790CA16-441C-1C20-EB39-F54B2B6EBD07}"/>
-          </ac:cxnSpMkLst>
-        </pc:cxnChg>
       </pc:sldChg>
       <pc:sldChg chg="modSp mod">
         <pc:chgData name="Sonia Tara Hegde" userId="d93a2558-a889-4521-bcb4-6ed3fce9e012" providerId="ADAL" clId="{353A459F-1326-E646-9951-1A5C678B88AF}" dt="2025-05-19T23:00:29.295" v="2451" actId="1076"/>
@@ -1240,14 +716,6 @@
             <pc:docMk/>
             <pc:sldMk cId="2308003049" sldId="306"/>
             <ac:spMk id="2" creationId="{3F623FDA-62CD-2A96-E96F-69DEC5FF6A47}"/>
-          </ac:spMkLst>
-        </pc:spChg>
-        <pc:spChg chg="add del mod">
-          <ac:chgData name="Sonia Tara Hegde" userId="d93a2558-a889-4521-bcb4-6ed3fce9e012" providerId="ADAL" clId="{353A459F-1326-E646-9951-1A5C678B88AF}" dt="2025-05-19T18:11:53.318" v="2441" actId="478"/>
-          <ac:spMkLst>
-            <pc:docMk/>
-            <pc:sldMk cId="2308003049" sldId="306"/>
-            <ac:spMk id="5" creationId="{CC2876C4-8C45-28D8-44C0-52E56312B7E9}"/>
           </ac:spMkLst>
         </pc:spChg>
         <pc:spChg chg="mod">
@@ -1335,8 +803,8 @@
           </ac:spMkLst>
         </pc:spChg>
       </pc:sldChg>
-      <pc:sldChg chg="modSp mod">
-        <pc:chgData name="Sonia Tara Hegde" userId="d93a2558-a889-4521-bcb4-6ed3fce9e012" providerId="ADAL" clId="{353A459F-1326-E646-9951-1A5C678B88AF}" dt="2025-05-19T17:11:54.783" v="88" actId="20577"/>
+      <pc:sldChg chg="modSp mod modNotesTx">
+        <pc:chgData name="Sonia Tara Hegde" userId="d93a2558-a889-4521-bcb4-6ed3fce9e012" providerId="ADAL" clId="{353A459F-1326-E646-9951-1A5C678B88AF}" dt="2025-05-22T04:43:59.160" v="2808" actId="20577"/>
         <pc:sldMkLst>
           <pc:docMk/>
           <pc:sldMk cId="1970428124" sldId="311"/>
@@ -1371,30 +839,6 @@
             <ac:spMk id="3" creationId="{14812522-68ED-F54E-A149-754C5AAB7C48}"/>
           </ac:spMkLst>
         </pc:spChg>
-        <pc:cxnChg chg="del">
-          <ac:chgData name="Sonia Tara Hegde" userId="d93a2558-a889-4521-bcb4-6ed3fce9e012" providerId="ADAL" clId="{353A459F-1326-E646-9951-1A5C678B88AF}" dt="2025-05-19T22:59:46.745" v="2447" actId="478"/>
-          <ac:cxnSpMkLst>
-            <pc:docMk/>
-            <pc:sldMk cId="1444229574" sldId="313"/>
-            <ac:cxnSpMk id="4" creationId="{CA91413F-4EC0-1D95-283C-B891F4F5DD87}"/>
-          </ac:cxnSpMkLst>
-        </pc:cxnChg>
-        <pc:cxnChg chg="del">
-          <ac:chgData name="Sonia Tara Hegde" userId="d93a2558-a889-4521-bcb4-6ed3fce9e012" providerId="ADAL" clId="{353A459F-1326-E646-9951-1A5C678B88AF}" dt="2025-05-19T22:59:46.745" v="2447" actId="478"/>
-          <ac:cxnSpMkLst>
-            <pc:docMk/>
-            <pc:sldMk cId="1444229574" sldId="313"/>
-            <ac:cxnSpMk id="5" creationId="{0962702E-BC91-5610-9C95-7A510E364E2F}"/>
-          </ac:cxnSpMkLst>
-        </pc:cxnChg>
-        <pc:cxnChg chg="del">
-          <ac:chgData name="Sonia Tara Hegde" userId="d93a2558-a889-4521-bcb4-6ed3fce9e012" providerId="ADAL" clId="{353A459F-1326-E646-9951-1A5C678B88AF}" dt="2025-05-19T22:59:46.745" v="2447" actId="478"/>
-          <ac:cxnSpMkLst>
-            <pc:docMk/>
-            <pc:sldMk cId="1444229574" sldId="313"/>
-            <ac:cxnSpMk id="6" creationId="{CB60F205-4819-546B-D26F-EB1C115C7721}"/>
-          </ac:cxnSpMkLst>
-        </pc:cxnChg>
       </pc:sldChg>
       <pc:sldChg chg="add">
         <pc:chgData name="Sonia Tara Hegde" userId="d93a2558-a889-4521-bcb4-6ed3fce9e012" providerId="ADAL" clId="{353A459F-1326-E646-9951-1A5C678B88AF}" dt="2025-05-19T18:04:41.974" v="2423"/>
@@ -1490,7 +934,7 @@
           <a:p>
             <a:fld id="{5C5D1EB4-F37D-7F4F-B96E-519D8F231415}" type="datetimeFigureOut">
               <a:rPr lang="en-US" smtClean="0"/>
-              <a:t>5/20/25</a:t>
+              <a:t>5/22/25</a:t>
             </a:fld>
             <a:endParaRPr lang="en-US"/>
           </a:p>
@@ -1801,22 +1245,7 @@
           <a:bodyPr/>
           <a:lstStyle/>
           <a:p>
-            <a:r>
-              <a:rPr lang="en-US" dirty="0"/>
-              <a:t>Now that we’ve completed the pre-processing step of the data, we will focus today on starting to draw inferences from our data, namely in ways to find seroprevalence. </a:t>
-            </a:r>
-          </a:p>
-          <a:p>
-            <a:r>
-              <a:rPr lang="en-US" dirty="0"/>
-              <a:t>Before that, let’s first look at our sample data.</a:t>
-            </a:r>
-          </a:p>
-          <a:p>
-            <a:r>
-              <a:rPr lang="en-US" dirty="0"/>
-              <a:t>Its important to visually inspect your data to determine if there is anything unusual before you get started applying equations</a:t>
-            </a:r>
+            <a:endParaRPr lang="en-US" dirty="0"/>
           </a:p>
         </p:txBody>
       </p:sp>
@@ -1899,341 +1328,6 @@
         <p:txBody>
           <a:bodyPr/>
           <a:lstStyle/>
-          <a:p>
-            <a:pPr marL="342900" marR="0" lvl="0" indent="-342900">
-              <a:lnSpc>
-                <a:spcPct val="115000"/>
-              </a:lnSpc>
-              <a:buFont typeface="Symbol" pitchFamily="2" charset="2"/>
-              <a:buChar char=""/>
-            </a:pPr>
-            <a:r>
-              <a:rPr lang="en-US" sz="1200" kern="100" dirty="0">
-                <a:effectLst/>
-                <a:latin typeface="Aptos" panose="020B0004020202020204" pitchFamily="34" charset="0"/>
-                <a:ea typeface="Aptos" panose="020B0004020202020204" pitchFamily="34" charset="0"/>
-                <a:cs typeface="Times New Roman" panose="02020603050405020304" pitchFamily="18" charset="0"/>
-              </a:rPr>
-              <a:t>Example with measles- well-defined correlate of protection (15 min, with students putting in code as well)</a:t>
-            </a:r>
-          </a:p>
-          <a:p>
-            <a:pPr marL="742950" marR="0" lvl="1" indent="-285750">
-              <a:lnSpc>
-                <a:spcPct val="115000"/>
-              </a:lnSpc>
-              <a:buFont typeface="Courier New" panose="02070309020205020404" pitchFamily="49" charset="0"/>
-              <a:buChar char="o"/>
-            </a:pPr>
-            <a:r>
-              <a:rPr lang="en-US" sz="1200" kern="100" dirty="0">
-                <a:effectLst/>
-                <a:latin typeface="Aptos" panose="020B0004020202020204" pitchFamily="34" charset="0"/>
-                <a:ea typeface="Aptos" panose="020B0004020202020204" pitchFamily="34" charset="0"/>
-                <a:cs typeface="Times New Roman" panose="02020603050405020304" pitchFamily="18" charset="0"/>
-              </a:rPr>
-              <a:t>Easy to justify using cutoff when there is a correlate of protection</a:t>
-            </a:r>
-          </a:p>
-          <a:p>
-            <a:pPr marL="742950" marR="0" lvl="1" indent="-285750">
-              <a:lnSpc>
-                <a:spcPct val="115000"/>
-              </a:lnSpc>
-              <a:buFont typeface="Courier New" panose="02070309020205020404" pitchFamily="49" charset="0"/>
-              <a:buChar char="o"/>
-            </a:pPr>
-            <a:r>
-              <a:rPr lang="en-US" sz="1200" kern="100" dirty="0">
-                <a:effectLst/>
-                <a:latin typeface="Aptos" panose="020B0004020202020204" pitchFamily="34" charset="0"/>
-                <a:ea typeface="Aptos" panose="020B0004020202020204" pitchFamily="34" charset="0"/>
-                <a:cs typeface="Times New Roman" panose="02020603050405020304" pitchFamily="18" charset="0"/>
-              </a:rPr>
-              <a:t>To get MFI, we must use standard curve to convert international units to MFI.</a:t>
-            </a:r>
-          </a:p>
-          <a:p>
-            <a:pPr marL="1143000" marR="0" lvl="2" indent="-228600">
-              <a:lnSpc>
-                <a:spcPct val="115000"/>
-              </a:lnSpc>
-              <a:buFont typeface="Wingdings" pitchFamily="2" charset="2"/>
-              <a:buChar char=""/>
-            </a:pPr>
-            <a:r>
-              <a:rPr lang="en-US" sz="1200" kern="100" dirty="0">
-                <a:effectLst/>
-                <a:highlight>
-                  <a:srgbClr val="FFFF00"/>
-                </a:highlight>
-                <a:latin typeface="Aptos" panose="020B0004020202020204" pitchFamily="34" charset="0"/>
-                <a:ea typeface="Aptos" panose="020B0004020202020204" pitchFamily="34" charset="0"/>
-                <a:cs typeface="Times New Roman" panose="02020603050405020304" pitchFamily="18" charset="0"/>
-              </a:rPr>
-              <a:t>To convert this, </a:t>
-            </a:r>
-            <a:r>
-              <a:rPr lang="en-US" sz="800" kern="100" dirty="0">
-                <a:effectLst/>
-                <a:latin typeface="Aptos" panose="020B0004020202020204" pitchFamily="34" charset="0"/>
-                <a:ea typeface="Aptos" panose="020B0004020202020204" pitchFamily="34" charset="0"/>
-                <a:cs typeface="Times New Roman" panose="02020603050405020304" pitchFamily="18" charset="0"/>
-              </a:rPr>
-              <a:t> </a:t>
-            </a:r>
-            <a:r>
-              <a:rPr lang="en-US" sz="1200" kern="100" dirty="0">
-                <a:effectLst/>
-                <a:highlight>
-                  <a:srgbClr val="FFFF00"/>
-                </a:highlight>
-                <a:latin typeface="Aptos" panose="020B0004020202020204" pitchFamily="34" charset="0"/>
-                <a:ea typeface="Aptos" panose="020B0004020202020204" pitchFamily="34" charset="0"/>
-                <a:cs typeface="Times New Roman" panose="02020603050405020304" pitchFamily="18" charset="0"/>
-              </a:rPr>
-              <a:t>we need to use standards from controls samples that were tested at different known concentrations that will have different UIs. From this, we can convert the standardized UI to an MFI value that we can compare to our data. </a:t>
-            </a:r>
-            <a:endParaRPr lang="en-US" sz="1200" kern="100" dirty="0">
-              <a:effectLst/>
-              <a:latin typeface="Aptos" panose="020B0004020202020204" pitchFamily="34" charset="0"/>
-              <a:ea typeface="Aptos" panose="020B0004020202020204" pitchFamily="34" charset="0"/>
-              <a:cs typeface="Times New Roman" panose="02020603050405020304" pitchFamily="18" charset="0"/>
-            </a:endParaRPr>
-          </a:p>
-          <a:p>
-            <a:pPr marL="1143000" marR="0" lvl="2" indent="-228600">
-              <a:lnSpc>
-                <a:spcPct val="115000"/>
-              </a:lnSpc>
-              <a:buFont typeface="Wingdings" pitchFamily="2" charset="2"/>
-              <a:buChar char=""/>
-            </a:pPr>
-            <a:r>
-              <a:rPr lang="en-US" sz="1200" kern="100" dirty="0">
-                <a:effectLst/>
-                <a:highlight>
-                  <a:srgbClr val="FFFF00"/>
-                </a:highlight>
-                <a:latin typeface="Aptos" panose="020B0004020202020204" pitchFamily="34" charset="0"/>
-                <a:ea typeface="Aptos" panose="020B0004020202020204" pitchFamily="34" charset="0"/>
-                <a:cs typeface="Times New Roman" panose="02020603050405020304" pitchFamily="18" charset="0"/>
-              </a:rPr>
-              <a:t>The standard curve is created using </a:t>
-            </a:r>
-            <a:r>
-              <a:rPr lang="en-US" sz="1200" b="1" kern="100" dirty="0">
-                <a:effectLst/>
-                <a:highlight>
-                  <a:srgbClr val="FFFF00"/>
-                </a:highlight>
-                <a:latin typeface="Aptos" panose="020B0004020202020204" pitchFamily="34" charset="0"/>
-                <a:ea typeface="Aptos" panose="020B0004020202020204" pitchFamily="34" charset="0"/>
-                <a:cs typeface="Times New Roman" panose="02020603050405020304" pitchFamily="18" charset="0"/>
-              </a:rPr>
-              <a:t>known concentrations</a:t>
-            </a:r>
-            <a:r>
-              <a:rPr lang="en-US" sz="1200" kern="100" dirty="0">
-                <a:effectLst/>
-                <a:highlight>
-                  <a:srgbClr val="FFFF00"/>
-                </a:highlight>
-                <a:latin typeface="Aptos" panose="020B0004020202020204" pitchFamily="34" charset="0"/>
-                <a:ea typeface="Aptos" panose="020B0004020202020204" pitchFamily="34" charset="0"/>
-                <a:cs typeface="Times New Roman" panose="02020603050405020304" pitchFamily="18" charset="0"/>
-              </a:rPr>
-              <a:t> of antibody standards, measured on the same plate as the unknown samples.</a:t>
-            </a:r>
-            <a:endParaRPr lang="en-US" sz="1200" kern="100" dirty="0">
-              <a:effectLst/>
-              <a:latin typeface="Aptos" panose="020B0004020202020204" pitchFamily="34" charset="0"/>
-              <a:ea typeface="Aptos" panose="020B0004020202020204" pitchFamily="34" charset="0"/>
-              <a:cs typeface="Times New Roman" panose="02020603050405020304" pitchFamily="18" charset="0"/>
-            </a:endParaRPr>
-          </a:p>
-          <a:p>
-            <a:pPr marL="1143000" marR="0" lvl="2" indent="-228600">
-              <a:lnSpc>
-                <a:spcPct val="115000"/>
-              </a:lnSpc>
-              <a:spcAft>
-                <a:spcPts val="800"/>
-              </a:spcAft>
-              <a:buFont typeface="Wingdings" pitchFamily="2" charset="2"/>
-              <a:buChar char=""/>
-            </a:pPr>
-            <a:r>
-              <a:rPr lang="en-US" sz="1200" kern="100" dirty="0">
-                <a:effectLst/>
-                <a:highlight>
-                  <a:srgbClr val="FFFF00"/>
-                </a:highlight>
-                <a:latin typeface="Aptos" panose="020B0004020202020204" pitchFamily="34" charset="0"/>
-                <a:ea typeface="Aptos" panose="020B0004020202020204" pitchFamily="34" charset="0"/>
-                <a:cs typeface="Times New Roman" panose="02020603050405020304" pitchFamily="18" charset="0"/>
-              </a:rPr>
-              <a:t>First we fit a model to our data to establish the relationship between </a:t>
-            </a:r>
-            <a:r>
-              <a:rPr lang="en-US" sz="1200" b="1" kern="100" dirty="0">
-                <a:effectLst/>
-                <a:highlight>
-                  <a:srgbClr val="FFFF00"/>
-                </a:highlight>
-                <a:latin typeface="Aptos" panose="020B0004020202020204" pitchFamily="34" charset="0"/>
-                <a:ea typeface="Aptos" panose="020B0004020202020204" pitchFamily="34" charset="0"/>
-                <a:cs typeface="Times New Roman" panose="02020603050405020304" pitchFamily="18" charset="0"/>
-              </a:rPr>
-              <a:t>MFI values</a:t>
-            </a:r>
-            <a:r>
-              <a:rPr lang="en-US" sz="1200" kern="100" dirty="0">
-                <a:effectLst/>
-                <a:highlight>
-                  <a:srgbClr val="FFFF00"/>
-                </a:highlight>
-                <a:latin typeface="Aptos" panose="020B0004020202020204" pitchFamily="34" charset="0"/>
-                <a:ea typeface="Aptos" panose="020B0004020202020204" pitchFamily="34" charset="0"/>
-                <a:cs typeface="Times New Roman" panose="02020603050405020304" pitchFamily="18" charset="0"/>
-              </a:rPr>
-              <a:t> and known </a:t>
-            </a:r>
-            <a:r>
-              <a:rPr lang="en-US" sz="1200" b="1" kern="100" dirty="0">
-                <a:effectLst/>
-                <a:highlight>
-                  <a:srgbClr val="FFFF00"/>
-                </a:highlight>
-                <a:latin typeface="Aptos" panose="020B0004020202020204" pitchFamily="34" charset="0"/>
-                <a:ea typeface="Aptos" panose="020B0004020202020204" pitchFamily="34" charset="0"/>
-                <a:cs typeface="Times New Roman" panose="02020603050405020304" pitchFamily="18" charset="0"/>
-              </a:rPr>
-              <a:t>IU/mL concentrations</a:t>
-            </a:r>
-            <a:r>
-              <a:rPr lang="en-US" sz="1200" kern="100" dirty="0">
-                <a:effectLst/>
-                <a:highlight>
-                  <a:srgbClr val="FFFF00"/>
-                </a:highlight>
-                <a:latin typeface="Aptos" panose="020B0004020202020204" pitchFamily="34" charset="0"/>
-                <a:ea typeface="Aptos" panose="020B0004020202020204" pitchFamily="34" charset="0"/>
-                <a:cs typeface="Times New Roman" panose="02020603050405020304" pitchFamily="18" charset="0"/>
-              </a:rPr>
-              <a:t>.</a:t>
-            </a:r>
-            <a:endParaRPr lang="en-US" sz="1200" kern="100" dirty="0">
-              <a:effectLst/>
-              <a:latin typeface="Aptos" panose="020B0004020202020204" pitchFamily="34" charset="0"/>
-              <a:ea typeface="Aptos" panose="020B0004020202020204" pitchFamily="34" charset="0"/>
-              <a:cs typeface="Times New Roman" panose="02020603050405020304" pitchFamily="18" charset="0"/>
-            </a:endParaRPr>
-          </a:p>
-          <a:p>
-            <a:endParaRPr lang="en-US" dirty="0"/>
-          </a:p>
-          <a:p>
-            <a:pPr marL="0" marR="0">
-              <a:lnSpc>
-                <a:spcPct val="115000"/>
-              </a:lnSpc>
-              <a:spcAft>
-                <a:spcPts val="800"/>
-              </a:spcAft>
-              <a:buNone/>
-            </a:pPr>
-            <a:endParaRPr lang="en-US" sz="1800" kern="100" dirty="0">
-              <a:effectLst/>
-              <a:latin typeface="Aptos" panose="020B0004020202020204" pitchFamily="34" charset="0"/>
-              <a:ea typeface="Aptos" panose="020B0004020202020204" pitchFamily="34" charset="0"/>
-              <a:cs typeface="Times New Roman" panose="02020603050405020304" pitchFamily="18" charset="0"/>
-            </a:endParaRPr>
-          </a:p>
-          <a:p>
-            <a:pPr marL="0" marR="0">
-              <a:lnSpc>
-                <a:spcPct val="115000"/>
-              </a:lnSpc>
-              <a:spcAft>
-                <a:spcPts val="800"/>
-              </a:spcAft>
-              <a:buNone/>
-            </a:pPr>
-            <a:r>
-              <a:rPr lang="en-US" sz="1200" kern="100" dirty="0" err="1">
-                <a:solidFill>
-                  <a:srgbClr val="000000"/>
-                </a:solidFill>
-                <a:effectLst/>
-                <a:latin typeface="Aptos" panose="020B0004020202020204" pitchFamily="34" charset="0"/>
-                <a:ea typeface="Aptos" panose="020B0004020202020204" pitchFamily="34" charset="0"/>
-                <a:cs typeface="Times New Roman" panose="02020603050405020304" pitchFamily="18" charset="0"/>
-              </a:rPr>
-              <a:t>Chatgpt</a:t>
-            </a:r>
-            <a:r>
-              <a:rPr lang="en-US" sz="1200" kern="100" dirty="0">
-                <a:solidFill>
-                  <a:srgbClr val="000000"/>
-                </a:solidFill>
-                <a:effectLst/>
-                <a:latin typeface="Aptos" panose="020B0004020202020204" pitchFamily="34" charset="0"/>
-                <a:ea typeface="Aptos" panose="020B0004020202020204" pitchFamily="34" charset="0"/>
-                <a:cs typeface="Times New Roman" panose="02020603050405020304" pitchFamily="18" charset="0"/>
-              </a:rPr>
-              <a:t> prompt: in the same style as you did previously, write a section describing how to use the results of a standard curve. Standard curve is on a plate with results as MFI values from a multiplex bead assay. I want to use results from a standard curve to then convert international units to </a:t>
-            </a:r>
-            <a:r>
-              <a:rPr lang="en-US" sz="1200" kern="100" dirty="0" err="1">
-                <a:solidFill>
-                  <a:srgbClr val="000000"/>
-                </a:solidFill>
-                <a:effectLst/>
-                <a:latin typeface="Aptos" panose="020B0004020202020204" pitchFamily="34" charset="0"/>
-                <a:ea typeface="Aptos" panose="020B0004020202020204" pitchFamily="34" charset="0"/>
-                <a:cs typeface="Times New Roman" panose="02020603050405020304" pitchFamily="18" charset="0"/>
-              </a:rPr>
-              <a:t>mfi</a:t>
-            </a:r>
-            <a:r>
-              <a:rPr lang="en-US" sz="1200" kern="100" dirty="0">
-                <a:solidFill>
-                  <a:srgbClr val="000000"/>
-                </a:solidFill>
-                <a:effectLst/>
-                <a:latin typeface="Aptos" panose="020B0004020202020204" pitchFamily="34" charset="0"/>
-                <a:ea typeface="Aptos" panose="020B0004020202020204" pitchFamily="34" charset="0"/>
-                <a:cs typeface="Times New Roman" panose="02020603050405020304" pitchFamily="18" charset="0"/>
-              </a:rPr>
-              <a:t> to determine the cutoffs in a serological surveillance study.</a:t>
-            </a:r>
-            <a:endParaRPr lang="en-US" sz="1800" kern="100" dirty="0">
-              <a:effectLst/>
-              <a:latin typeface="Aptos" panose="020B0004020202020204" pitchFamily="34" charset="0"/>
-              <a:ea typeface="Aptos" panose="020B0004020202020204" pitchFamily="34" charset="0"/>
-              <a:cs typeface="Times New Roman" panose="02020603050405020304" pitchFamily="18" charset="0"/>
-            </a:endParaRPr>
-          </a:p>
-          <a:p>
-            <a:pPr marL="0" marR="0">
-              <a:lnSpc>
-                <a:spcPct val="115000"/>
-              </a:lnSpc>
-              <a:spcAft>
-                <a:spcPts val="800"/>
-              </a:spcAft>
-            </a:pPr>
-            <a:r>
-              <a:rPr lang="en-US" sz="1800" kern="100" dirty="0">
-                <a:effectLst/>
-                <a:latin typeface="Aptos" panose="020B0004020202020204" pitchFamily="34" charset="0"/>
-                <a:ea typeface="Aptos" panose="020B0004020202020204" pitchFamily="34" charset="0"/>
-                <a:cs typeface="Times New Roman" panose="02020603050405020304" pitchFamily="18" charset="0"/>
-              </a:rPr>
-              <a:t> </a:t>
-            </a:r>
-          </a:p>
           <a:p>
             <a:endParaRPr lang="en-US" dirty="0"/>
           </a:p>
@@ -2337,322 +1431,6 @@
           <a:bodyPr/>
           <a:lstStyle/>
           <a:p>
-            <a:pPr marL="342900" marR="0" lvl="0" indent="-342900">
-              <a:lnSpc>
-                <a:spcPct val="115000"/>
-              </a:lnSpc>
-              <a:buFont typeface="Symbol" pitchFamily="2" charset="2"/>
-              <a:buChar char=""/>
-            </a:pPr>
-            <a:r>
-              <a:rPr lang="en-US" sz="1200" kern="100" dirty="0">
-                <a:effectLst/>
-                <a:latin typeface="Aptos" panose="020B0004020202020204" pitchFamily="34" charset="0"/>
-                <a:ea typeface="Aptos" panose="020B0004020202020204" pitchFamily="34" charset="0"/>
-                <a:cs typeface="Times New Roman" panose="02020603050405020304" pitchFamily="18" charset="0"/>
-              </a:rPr>
-              <a:t>Example with measles- well-defined correlate of protection (15 min, with students putting in code as well)</a:t>
-            </a:r>
-          </a:p>
-          <a:p>
-            <a:pPr marL="742950" marR="0" lvl="1" indent="-285750">
-              <a:lnSpc>
-                <a:spcPct val="115000"/>
-              </a:lnSpc>
-              <a:buFont typeface="Courier New" panose="02070309020205020404" pitchFamily="49" charset="0"/>
-              <a:buChar char="o"/>
-            </a:pPr>
-            <a:r>
-              <a:rPr lang="en-US" sz="1200" kern="100" dirty="0">
-                <a:effectLst/>
-                <a:latin typeface="Aptos" panose="020B0004020202020204" pitchFamily="34" charset="0"/>
-                <a:ea typeface="Aptos" panose="020B0004020202020204" pitchFamily="34" charset="0"/>
-                <a:cs typeface="Times New Roman" panose="02020603050405020304" pitchFamily="18" charset="0"/>
-              </a:rPr>
-              <a:t>Easy to justify using cutoff when there is a correlate of protection</a:t>
-            </a:r>
-          </a:p>
-          <a:p>
-            <a:pPr marL="742950" marR="0" lvl="1" indent="-285750">
-              <a:lnSpc>
-                <a:spcPct val="115000"/>
-              </a:lnSpc>
-              <a:buFont typeface="Courier New" panose="02070309020205020404" pitchFamily="49" charset="0"/>
-              <a:buChar char="o"/>
-            </a:pPr>
-            <a:r>
-              <a:rPr lang="en-US" sz="1200" kern="100" dirty="0">
-                <a:effectLst/>
-                <a:latin typeface="Aptos" panose="020B0004020202020204" pitchFamily="34" charset="0"/>
-                <a:ea typeface="Aptos" panose="020B0004020202020204" pitchFamily="34" charset="0"/>
-                <a:cs typeface="Times New Roman" panose="02020603050405020304" pitchFamily="18" charset="0"/>
-              </a:rPr>
-              <a:t>To get MFI, we must use standard curve to convert international units to MFI.</a:t>
-            </a:r>
-          </a:p>
-          <a:p>
-            <a:pPr marL="1143000" marR="0" lvl="2" indent="-228600">
-              <a:lnSpc>
-                <a:spcPct val="115000"/>
-              </a:lnSpc>
-              <a:buFont typeface="Wingdings" pitchFamily="2" charset="2"/>
-              <a:buChar char=""/>
-            </a:pPr>
-            <a:r>
-              <a:rPr lang="en-US" sz="1200" kern="100" dirty="0">
-                <a:effectLst/>
-                <a:highlight>
-                  <a:srgbClr val="FFFF00"/>
-                </a:highlight>
-                <a:latin typeface="Aptos" panose="020B0004020202020204" pitchFamily="34" charset="0"/>
-                <a:ea typeface="Aptos" panose="020B0004020202020204" pitchFamily="34" charset="0"/>
-                <a:cs typeface="Times New Roman" panose="02020603050405020304" pitchFamily="18" charset="0"/>
-              </a:rPr>
-              <a:t>To convert this, </a:t>
-            </a:r>
-            <a:r>
-              <a:rPr lang="en-US" sz="800" kern="100" dirty="0">
-                <a:effectLst/>
-                <a:latin typeface="Aptos" panose="020B0004020202020204" pitchFamily="34" charset="0"/>
-                <a:ea typeface="Aptos" panose="020B0004020202020204" pitchFamily="34" charset="0"/>
-                <a:cs typeface="Times New Roman" panose="02020603050405020304" pitchFamily="18" charset="0"/>
-              </a:rPr>
-              <a:t> </a:t>
-            </a:r>
-            <a:r>
-              <a:rPr lang="en-US" sz="1200" kern="100" dirty="0">
-                <a:effectLst/>
-                <a:highlight>
-                  <a:srgbClr val="FFFF00"/>
-                </a:highlight>
-                <a:latin typeface="Aptos" panose="020B0004020202020204" pitchFamily="34" charset="0"/>
-                <a:ea typeface="Aptos" panose="020B0004020202020204" pitchFamily="34" charset="0"/>
-                <a:cs typeface="Times New Roman" panose="02020603050405020304" pitchFamily="18" charset="0"/>
-              </a:rPr>
-              <a:t>we need to use standards from controls samples that were tested at different known concentrations that will have different UIs. From this, we can convert the standardized UI to an MFI value that we can compare to our data. </a:t>
-            </a:r>
-            <a:endParaRPr lang="en-US" sz="1200" kern="100" dirty="0">
-              <a:effectLst/>
-              <a:latin typeface="Aptos" panose="020B0004020202020204" pitchFamily="34" charset="0"/>
-              <a:ea typeface="Aptos" panose="020B0004020202020204" pitchFamily="34" charset="0"/>
-              <a:cs typeface="Times New Roman" panose="02020603050405020304" pitchFamily="18" charset="0"/>
-            </a:endParaRPr>
-          </a:p>
-          <a:p>
-            <a:pPr marL="1143000" marR="0" lvl="2" indent="-228600">
-              <a:lnSpc>
-                <a:spcPct val="115000"/>
-              </a:lnSpc>
-              <a:buFont typeface="Wingdings" pitchFamily="2" charset="2"/>
-              <a:buChar char=""/>
-            </a:pPr>
-            <a:r>
-              <a:rPr lang="en-US" sz="1200" kern="100" dirty="0">
-                <a:effectLst/>
-                <a:highlight>
-                  <a:srgbClr val="FFFF00"/>
-                </a:highlight>
-                <a:latin typeface="Aptos" panose="020B0004020202020204" pitchFamily="34" charset="0"/>
-                <a:ea typeface="Aptos" panose="020B0004020202020204" pitchFamily="34" charset="0"/>
-                <a:cs typeface="Times New Roman" panose="02020603050405020304" pitchFamily="18" charset="0"/>
-              </a:rPr>
-              <a:t>The standard curve is created using </a:t>
-            </a:r>
-            <a:r>
-              <a:rPr lang="en-US" sz="1200" b="1" kern="100" dirty="0">
-                <a:effectLst/>
-                <a:highlight>
-                  <a:srgbClr val="FFFF00"/>
-                </a:highlight>
-                <a:latin typeface="Aptos" panose="020B0004020202020204" pitchFamily="34" charset="0"/>
-                <a:ea typeface="Aptos" panose="020B0004020202020204" pitchFamily="34" charset="0"/>
-                <a:cs typeface="Times New Roman" panose="02020603050405020304" pitchFamily="18" charset="0"/>
-              </a:rPr>
-              <a:t>known concentrations</a:t>
-            </a:r>
-            <a:r>
-              <a:rPr lang="en-US" sz="1200" kern="100" dirty="0">
-                <a:effectLst/>
-                <a:highlight>
-                  <a:srgbClr val="FFFF00"/>
-                </a:highlight>
-                <a:latin typeface="Aptos" panose="020B0004020202020204" pitchFamily="34" charset="0"/>
-                <a:ea typeface="Aptos" panose="020B0004020202020204" pitchFamily="34" charset="0"/>
-                <a:cs typeface="Times New Roman" panose="02020603050405020304" pitchFamily="18" charset="0"/>
-              </a:rPr>
-              <a:t> of antibody standards, measured on the same plate as the unknown samples.</a:t>
-            </a:r>
-            <a:endParaRPr lang="en-US" sz="1200" kern="100" dirty="0">
-              <a:effectLst/>
-              <a:latin typeface="Aptos" panose="020B0004020202020204" pitchFamily="34" charset="0"/>
-              <a:ea typeface="Aptos" panose="020B0004020202020204" pitchFamily="34" charset="0"/>
-              <a:cs typeface="Times New Roman" panose="02020603050405020304" pitchFamily="18" charset="0"/>
-            </a:endParaRPr>
-          </a:p>
-          <a:p>
-            <a:pPr marL="1143000" marR="0" lvl="2" indent="-228600">
-              <a:lnSpc>
-                <a:spcPct val="115000"/>
-              </a:lnSpc>
-              <a:spcAft>
-                <a:spcPts val="800"/>
-              </a:spcAft>
-              <a:buFont typeface="Wingdings" pitchFamily="2" charset="2"/>
-              <a:buChar char=""/>
-            </a:pPr>
-            <a:r>
-              <a:rPr lang="en-US" sz="1200" kern="100" dirty="0">
-                <a:effectLst/>
-                <a:highlight>
-                  <a:srgbClr val="FFFF00"/>
-                </a:highlight>
-                <a:latin typeface="Aptos" panose="020B0004020202020204" pitchFamily="34" charset="0"/>
-                <a:ea typeface="Aptos" panose="020B0004020202020204" pitchFamily="34" charset="0"/>
-                <a:cs typeface="Times New Roman" panose="02020603050405020304" pitchFamily="18" charset="0"/>
-              </a:rPr>
-              <a:t>First we fit a model to our data to establish the relationship between </a:t>
-            </a:r>
-            <a:r>
-              <a:rPr lang="en-US" sz="1200" b="1" kern="100" dirty="0">
-                <a:effectLst/>
-                <a:highlight>
-                  <a:srgbClr val="FFFF00"/>
-                </a:highlight>
-                <a:latin typeface="Aptos" panose="020B0004020202020204" pitchFamily="34" charset="0"/>
-                <a:ea typeface="Aptos" panose="020B0004020202020204" pitchFamily="34" charset="0"/>
-                <a:cs typeface="Times New Roman" panose="02020603050405020304" pitchFamily="18" charset="0"/>
-              </a:rPr>
-              <a:t>MFI values</a:t>
-            </a:r>
-            <a:r>
-              <a:rPr lang="en-US" sz="1200" kern="100" dirty="0">
-                <a:effectLst/>
-                <a:highlight>
-                  <a:srgbClr val="FFFF00"/>
-                </a:highlight>
-                <a:latin typeface="Aptos" panose="020B0004020202020204" pitchFamily="34" charset="0"/>
-                <a:ea typeface="Aptos" panose="020B0004020202020204" pitchFamily="34" charset="0"/>
-                <a:cs typeface="Times New Roman" panose="02020603050405020304" pitchFamily="18" charset="0"/>
-              </a:rPr>
-              <a:t> and known </a:t>
-            </a:r>
-            <a:r>
-              <a:rPr lang="en-US" sz="1200" b="1" kern="100" dirty="0">
-                <a:effectLst/>
-                <a:highlight>
-                  <a:srgbClr val="FFFF00"/>
-                </a:highlight>
-                <a:latin typeface="Aptos" panose="020B0004020202020204" pitchFamily="34" charset="0"/>
-                <a:ea typeface="Aptos" panose="020B0004020202020204" pitchFamily="34" charset="0"/>
-                <a:cs typeface="Times New Roman" panose="02020603050405020304" pitchFamily="18" charset="0"/>
-              </a:rPr>
-              <a:t>IU/mL concentrations</a:t>
-            </a:r>
-            <a:r>
-              <a:rPr lang="en-US" sz="1200" kern="100" dirty="0">
-                <a:effectLst/>
-                <a:highlight>
-                  <a:srgbClr val="FFFF00"/>
-                </a:highlight>
-                <a:latin typeface="Aptos" panose="020B0004020202020204" pitchFamily="34" charset="0"/>
-                <a:ea typeface="Aptos" panose="020B0004020202020204" pitchFamily="34" charset="0"/>
-                <a:cs typeface="Times New Roman" panose="02020603050405020304" pitchFamily="18" charset="0"/>
-              </a:rPr>
-              <a:t>.</a:t>
-            </a:r>
-            <a:endParaRPr lang="en-US" sz="1200" kern="100" dirty="0">
-              <a:effectLst/>
-              <a:latin typeface="Aptos" panose="020B0004020202020204" pitchFamily="34" charset="0"/>
-              <a:ea typeface="Aptos" panose="020B0004020202020204" pitchFamily="34" charset="0"/>
-              <a:cs typeface="Times New Roman" panose="02020603050405020304" pitchFamily="18" charset="0"/>
-            </a:endParaRPr>
-          </a:p>
-          <a:p>
-            <a:endParaRPr lang="en-US" dirty="0"/>
-          </a:p>
-          <a:p>
-            <a:pPr marL="0" marR="0">
-              <a:lnSpc>
-                <a:spcPct val="115000"/>
-              </a:lnSpc>
-              <a:spcAft>
-                <a:spcPts val="800"/>
-              </a:spcAft>
-              <a:buNone/>
-            </a:pPr>
-            <a:endParaRPr lang="en-US" sz="1800" kern="100" dirty="0">
-              <a:effectLst/>
-              <a:latin typeface="Aptos" panose="020B0004020202020204" pitchFamily="34" charset="0"/>
-              <a:ea typeface="Aptos" panose="020B0004020202020204" pitchFamily="34" charset="0"/>
-              <a:cs typeface="Times New Roman" panose="02020603050405020304" pitchFamily="18" charset="0"/>
-            </a:endParaRPr>
-          </a:p>
-          <a:p>
-            <a:pPr marL="0" marR="0">
-              <a:lnSpc>
-                <a:spcPct val="115000"/>
-              </a:lnSpc>
-              <a:spcAft>
-                <a:spcPts val="800"/>
-              </a:spcAft>
-              <a:buNone/>
-            </a:pPr>
-            <a:r>
-              <a:rPr lang="en-US" sz="1200" kern="100" dirty="0" err="1">
-                <a:solidFill>
-                  <a:srgbClr val="000000"/>
-                </a:solidFill>
-                <a:effectLst/>
-                <a:latin typeface="Aptos" panose="020B0004020202020204" pitchFamily="34" charset="0"/>
-                <a:ea typeface="Aptos" panose="020B0004020202020204" pitchFamily="34" charset="0"/>
-                <a:cs typeface="Times New Roman" panose="02020603050405020304" pitchFamily="18" charset="0"/>
-              </a:rPr>
-              <a:t>Chatgpt</a:t>
-            </a:r>
-            <a:r>
-              <a:rPr lang="en-US" sz="1200" kern="100" dirty="0">
-                <a:solidFill>
-                  <a:srgbClr val="000000"/>
-                </a:solidFill>
-                <a:effectLst/>
-                <a:latin typeface="Aptos" panose="020B0004020202020204" pitchFamily="34" charset="0"/>
-                <a:ea typeface="Aptos" panose="020B0004020202020204" pitchFamily="34" charset="0"/>
-                <a:cs typeface="Times New Roman" panose="02020603050405020304" pitchFamily="18" charset="0"/>
-              </a:rPr>
-              <a:t> prompt: in the same style as you did previously, write a section describing how to use the results of a standard curve. Standard curve is on a plate with results as MFI values from a multiplex bead assay. I want to use results from a standard curve to then convert international units to </a:t>
-            </a:r>
-            <a:r>
-              <a:rPr lang="en-US" sz="1200" kern="100" dirty="0" err="1">
-                <a:solidFill>
-                  <a:srgbClr val="000000"/>
-                </a:solidFill>
-                <a:effectLst/>
-                <a:latin typeface="Aptos" panose="020B0004020202020204" pitchFamily="34" charset="0"/>
-                <a:ea typeface="Aptos" panose="020B0004020202020204" pitchFamily="34" charset="0"/>
-                <a:cs typeface="Times New Roman" panose="02020603050405020304" pitchFamily="18" charset="0"/>
-              </a:rPr>
-              <a:t>mfi</a:t>
-            </a:r>
-            <a:r>
-              <a:rPr lang="en-US" sz="1200" kern="100" dirty="0">
-                <a:solidFill>
-                  <a:srgbClr val="000000"/>
-                </a:solidFill>
-                <a:effectLst/>
-                <a:latin typeface="Aptos" panose="020B0004020202020204" pitchFamily="34" charset="0"/>
-                <a:ea typeface="Aptos" panose="020B0004020202020204" pitchFamily="34" charset="0"/>
-                <a:cs typeface="Times New Roman" panose="02020603050405020304" pitchFamily="18" charset="0"/>
-              </a:rPr>
-              <a:t> to determine the cutoffs in a serological surveillance study.</a:t>
-            </a:r>
-            <a:endParaRPr lang="en-US" sz="1800" kern="100" dirty="0">
-              <a:effectLst/>
-              <a:latin typeface="Aptos" panose="020B0004020202020204" pitchFamily="34" charset="0"/>
-              <a:ea typeface="Aptos" panose="020B0004020202020204" pitchFamily="34" charset="0"/>
-              <a:cs typeface="Times New Roman" panose="02020603050405020304" pitchFamily="18" charset="0"/>
-            </a:endParaRPr>
-          </a:p>
-          <a:p>
             <a:pPr marL="0" marR="0">
               <a:lnSpc>
                 <a:spcPct val="115000"/>
@@ -2780,341 +1558,6 @@
           <a:bodyPr/>
           <a:lstStyle/>
           <a:p>
-            <a:pPr marL="342900" marR="0" lvl="0" indent="-342900">
-              <a:lnSpc>
-                <a:spcPct val="115000"/>
-              </a:lnSpc>
-              <a:buFont typeface="Symbol" pitchFamily="2" charset="2"/>
-              <a:buChar char=""/>
-            </a:pPr>
-            <a:r>
-              <a:rPr lang="en-US" sz="1200" kern="100" dirty="0">
-                <a:effectLst/>
-                <a:latin typeface="Aptos" panose="020B0004020202020204" pitchFamily="34" charset="0"/>
-                <a:ea typeface="Aptos" panose="020B0004020202020204" pitchFamily="34" charset="0"/>
-                <a:cs typeface="Times New Roman" panose="02020603050405020304" pitchFamily="18" charset="0"/>
-              </a:rPr>
-              <a:t>Example with measles- well-defined correlate of protection (15 min, with students putting in code as well)</a:t>
-            </a:r>
-          </a:p>
-          <a:p>
-            <a:pPr marL="742950" marR="0" lvl="1" indent="-285750">
-              <a:lnSpc>
-                <a:spcPct val="115000"/>
-              </a:lnSpc>
-              <a:buFont typeface="Courier New" panose="02070309020205020404" pitchFamily="49" charset="0"/>
-              <a:buChar char="o"/>
-            </a:pPr>
-            <a:r>
-              <a:rPr lang="en-US" sz="1200" kern="100" dirty="0">
-                <a:effectLst/>
-                <a:latin typeface="Aptos" panose="020B0004020202020204" pitchFamily="34" charset="0"/>
-                <a:ea typeface="Aptos" panose="020B0004020202020204" pitchFamily="34" charset="0"/>
-                <a:cs typeface="Times New Roman" panose="02020603050405020304" pitchFamily="18" charset="0"/>
-              </a:rPr>
-              <a:t>Easy to justify using cutoff when there is a correlate of protection</a:t>
-            </a:r>
-          </a:p>
-          <a:p>
-            <a:pPr marL="742950" marR="0" lvl="1" indent="-285750">
-              <a:lnSpc>
-                <a:spcPct val="115000"/>
-              </a:lnSpc>
-              <a:buFont typeface="Courier New" panose="02070309020205020404" pitchFamily="49" charset="0"/>
-              <a:buChar char="o"/>
-            </a:pPr>
-            <a:r>
-              <a:rPr lang="en-US" sz="1200" kern="100" dirty="0">
-                <a:effectLst/>
-                <a:latin typeface="Aptos" panose="020B0004020202020204" pitchFamily="34" charset="0"/>
-                <a:ea typeface="Aptos" panose="020B0004020202020204" pitchFamily="34" charset="0"/>
-                <a:cs typeface="Times New Roman" panose="02020603050405020304" pitchFamily="18" charset="0"/>
-              </a:rPr>
-              <a:t>To get MFI, we must use standard curve to convert international units to MFI.</a:t>
-            </a:r>
-          </a:p>
-          <a:p>
-            <a:pPr marL="1143000" marR="0" lvl="2" indent="-228600">
-              <a:lnSpc>
-                <a:spcPct val="115000"/>
-              </a:lnSpc>
-              <a:buFont typeface="Wingdings" pitchFamily="2" charset="2"/>
-              <a:buChar char=""/>
-            </a:pPr>
-            <a:r>
-              <a:rPr lang="en-US" sz="1200" kern="100" dirty="0">
-                <a:effectLst/>
-                <a:highlight>
-                  <a:srgbClr val="FFFF00"/>
-                </a:highlight>
-                <a:latin typeface="Aptos" panose="020B0004020202020204" pitchFamily="34" charset="0"/>
-                <a:ea typeface="Aptos" panose="020B0004020202020204" pitchFamily="34" charset="0"/>
-                <a:cs typeface="Times New Roman" panose="02020603050405020304" pitchFamily="18" charset="0"/>
-              </a:rPr>
-              <a:t>To convert this, </a:t>
-            </a:r>
-            <a:r>
-              <a:rPr lang="en-US" sz="800" kern="100" dirty="0">
-                <a:effectLst/>
-                <a:latin typeface="Aptos" panose="020B0004020202020204" pitchFamily="34" charset="0"/>
-                <a:ea typeface="Aptos" panose="020B0004020202020204" pitchFamily="34" charset="0"/>
-                <a:cs typeface="Times New Roman" panose="02020603050405020304" pitchFamily="18" charset="0"/>
-              </a:rPr>
-              <a:t> </a:t>
-            </a:r>
-            <a:r>
-              <a:rPr lang="en-US" sz="1200" kern="100" dirty="0">
-                <a:effectLst/>
-                <a:highlight>
-                  <a:srgbClr val="FFFF00"/>
-                </a:highlight>
-                <a:latin typeface="Aptos" panose="020B0004020202020204" pitchFamily="34" charset="0"/>
-                <a:ea typeface="Aptos" panose="020B0004020202020204" pitchFamily="34" charset="0"/>
-                <a:cs typeface="Times New Roman" panose="02020603050405020304" pitchFamily="18" charset="0"/>
-              </a:rPr>
-              <a:t>we need to use standards from controls samples that were tested at different known concentrations that will have different UIs. From this, we can convert the standardized UI to an MFI value that we can compare to our data. </a:t>
-            </a:r>
-            <a:endParaRPr lang="en-US" sz="1200" kern="100" dirty="0">
-              <a:effectLst/>
-              <a:latin typeface="Aptos" panose="020B0004020202020204" pitchFamily="34" charset="0"/>
-              <a:ea typeface="Aptos" panose="020B0004020202020204" pitchFamily="34" charset="0"/>
-              <a:cs typeface="Times New Roman" panose="02020603050405020304" pitchFamily="18" charset="0"/>
-            </a:endParaRPr>
-          </a:p>
-          <a:p>
-            <a:pPr marL="1143000" marR="0" lvl="2" indent="-228600">
-              <a:lnSpc>
-                <a:spcPct val="115000"/>
-              </a:lnSpc>
-              <a:buFont typeface="Wingdings" pitchFamily="2" charset="2"/>
-              <a:buChar char=""/>
-            </a:pPr>
-            <a:r>
-              <a:rPr lang="en-US" sz="1200" kern="100" dirty="0">
-                <a:effectLst/>
-                <a:highlight>
-                  <a:srgbClr val="FFFF00"/>
-                </a:highlight>
-                <a:latin typeface="Aptos" panose="020B0004020202020204" pitchFamily="34" charset="0"/>
-                <a:ea typeface="Aptos" panose="020B0004020202020204" pitchFamily="34" charset="0"/>
-                <a:cs typeface="Times New Roman" panose="02020603050405020304" pitchFamily="18" charset="0"/>
-              </a:rPr>
-              <a:t>The standard curve is created using </a:t>
-            </a:r>
-            <a:r>
-              <a:rPr lang="en-US" sz="1200" b="1" kern="100" dirty="0">
-                <a:effectLst/>
-                <a:highlight>
-                  <a:srgbClr val="FFFF00"/>
-                </a:highlight>
-                <a:latin typeface="Aptos" panose="020B0004020202020204" pitchFamily="34" charset="0"/>
-                <a:ea typeface="Aptos" panose="020B0004020202020204" pitchFamily="34" charset="0"/>
-                <a:cs typeface="Times New Roman" panose="02020603050405020304" pitchFamily="18" charset="0"/>
-              </a:rPr>
-              <a:t>known concentrations</a:t>
-            </a:r>
-            <a:r>
-              <a:rPr lang="en-US" sz="1200" kern="100" dirty="0">
-                <a:effectLst/>
-                <a:highlight>
-                  <a:srgbClr val="FFFF00"/>
-                </a:highlight>
-                <a:latin typeface="Aptos" panose="020B0004020202020204" pitchFamily="34" charset="0"/>
-                <a:ea typeface="Aptos" panose="020B0004020202020204" pitchFamily="34" charset="0"/>
-                <a:cs typeface="Times New Roman" panose="02020603050405020304" pitchFamily="18" charset="0"/>
-              </a:rPr>
-              <a:t> of antibody standards, measured on the same plate as the unknown samples.</a:t>
-            </a:r>
-            <a:endParaRPr lang="en-US" sz="1200" kern="100" dirty="0">
-              <a:effectLst/>
-              <a:latin typeface="Aptos" panose="020B0004020202020204" pitchFamily="34" charset="0"/>
-              <a:ea typeface="Aptos" panose="020B0004020202020204" pitchFamily="34" charset="0"/>
-              <a:cs typeface="Times New Roman" panose="02020603050405020304" pitchFamily="18" charset="0"/>
-            </a:endParaRPr>
-          </a:p>
-          <a:p>
-            <a:pPr marL="1143000" marR="0" lvl="2" indent="-228600">
-              <a:lnSpc>
-                <a:spcPct val="115000"/>
-              </a:lnSpc>
-              <a:spcAft>
-                <a:spcPts val="800"/>
-              </a:spcAft>
-              <a:buFont typeface="Wingdings" pitchFamily="2" charset="2"/>
-              <a:buChar char=""/>
-            </a:pPr>
-            <a:r>
-              <a:rPr lang="en-US" sz="1200" kern="100" dirty="0">
-                <a:effectLst/>
-                <a:highlight>
-                  <a:srgbClr val="FFFF00"/>
-                </a:highlight>
-                <a:latin typeface="Aptos" panose="020B0004020202020204" pitchFamily="34" charset="0"/>
-                <a:ea typeface="Aptos" panose="020B0004020202020204" pitchFamily="34" charset="0"/>
-                <a:cs typeface="Times New Roman" panose="02020603050405020304" pitchFamily="18" charset="0"/>
-              </a:rPr>
-              <a:t>First we fit a model to our data to establish the relationship between </a:t>
-            </a:r>
-            <a:r>
-              <a:rPr lang="en-US" sz="1200" b="1" kern="100" dirty="0">
-                <a:effectLst/>
-                <a:highlight>
-                  <a:srgbClr val="FFFF00"/>
-                </a:highlight>
-                <a:latin typeface="Aptos" panose="020B0004020202020204" pitchFamily="34" charset="0"/>
-                <a:ea typeface="Aptos" panose="020B0004020202020204" pitchFamily="34" charset="0"/>
-                <a:cs typeface="Times New Roman" panose="02020603050405020304" pitchFamily="18" charset="0"/>
-              </a:rPr>
-              <a:t>MFI values</a:t>
-            </a:r>
-            <a:r>
-              <a:rPr lang="en-US" sz="1200" kern="100" dirty="0">
-                <a:effectLst/>
-                <a:highlight>
-                  <a:srgbClr val="FFFF00"/>
-                </a:highlight>
-                <a:latin typeface="Aptos" panose="020B0004020202020204" pitchFamily="34" charset="0"/>
-                <a:ea typeface="Aptos" panose="020B0004020202020204" pitchFamily="34" charset="0"/>
-                <a:cs typeface="Times New Roman" panose="02020603050405020304" pitchFamily="18" charset="0"/>
-              </a:rPr>
-              <a:t> and known </a:t>
-            </a:r>
-            <a:r>
-              <a:rPr lang="en-US" sz="1200" b="1" kern="100" dirty="0">
-                <a:effectLst/>
-                <a:highlight>
-                  <a:srgbClr val="FFFF00"/>
-                </a:highlight>
-                <a:latin typeface="Aptos" panose="020B0004020202020204" pitchFamily="34" charset="0"/>
-                <a:ea typeface="Aptos" panose="020B0004020202020204" pitchFamily="34" charset="0"/>
-                <a:cs typeface="Times New Roman" panose="02020603050405020304" pitchFamily="18" charset="0"/>
-              </a:rPr>
-              <a:t>IU/mL concentrations</a:t>
-            </a:r>
-            <a:r>
-              <a:rPr lang="en-US" sz="1200" kern="100" dirty="0">
-                <a:effectLst/>
-                <a:highlight>
-                  <a:srgbClr val="FFFF00"/>
-                </a:highlight>
-                <a:latin typeface="Aptos" panose="020B0004020202020204" pitchFamily="34" charset="0"/>
-                <a:ea typeface="Aptos" panose="020B0004020202020204" pitchFamily="34" charset="0"/>
-                <a:cs typeface="Times New Roman" panose="02020603050405020304" pitchFamily="18" charset="0"/>
-              </a:rPr>
-              <a:t>.</a:t>
-            </a:r>
-            <a:endParaRPr lang="en-US" sz="1200" kern="100" dirty="0">
-              <a:effectLst/>
-              <a:latin typeface="Aptos" panose="020B0004020202020204" pitchFamily="34" charset="0"/>
-              <a:ea typeface="Aptos" panose="020B0004020202020204" pitchFamily="34" charset="0"/>
-              <a:cs typeface="Times New Roman" panose="02020603050405020304" pitchFamily="18" charset="0"/>
-            </a:endParaRPr>
-          </a:p>
-          <a:p>
-            <a:endParaRPr lang="en-US" dirty="0"/>
-          </a:p>
-          <a:p>
-            <a:pPr marL="0" marR="0">
-              <a:lnSpc>
-                <a:spcPct val="115000"/>
-              </a:lnSpc>
-              <a:spcAft>
-                <a:spcPts val="800"/>
-              </a:spcAft>
-              <a:buNone/>
-            </a:pPr>
-            <a:endParaRPr lang="en-US" sz="1800" kern="100" dirty="0">
-              <a:effectLst/>
-              <a:latin typeface="Aptos" panose="020B0004020202020204" pitchFamily="34" charset="0"/>
-              <a:ea typeface="Aptos" panose="020B0004020202020204" pitchFamily="34" charset="0"/>
-              <a:cs typeface="Times New Roman" panose="02020603050405020304" pitchFamily="18" charset="0"/>
-            </a:endParaRPr>
-          </a:p>
-          <a:p>
-            <a:pPr marL="0" marR="0">
-              <a:lnSpc>
-                <a:spcPct val="115000"/>
-              </a:lnSpc>
-              <a:spcAft>
-                <a:spcPts val="800"/>
-              </a:spcAft>
-              <a:buNone/>
-            </a:pPr>
-            <a:r>
-              <a:rPr lang="en-US" sz="1200" kern="100" dirty="0" err="1">
-                <a:solidFill>
-                  <a:srgbClr val="000000"/>
-                </a:solidFill>
-                <a:effectLst/>
-                <a:latin typeface="Aptos" panose="020B0004020202020204" pitchFamily="34" charset="0"/>
-                <a:ea typeface="Aptos" panose="020B0004020202020204" pitchFamily="34" charset="0"/>
-                <a:cs typeface="Times New Roman" panose="02020603050405020304" pitchFamily="18" charset="0"/>
-              </a:rPr>
-              <a:t>Chatgpt</a:t>
-            </a:r>
-            <a:r>
-              <a:rPr lang="en-US" sz="1200" kern="100" dirty="0">
-                <a:solidFill>
-                  <a:srgbClr val="000000"/>
-                </a:solidFill>
-                <a:effectLst/>
-                <a:latin typeface="Aptos" panose="020B0004020202020204" pitchFamily="34" charset="0"/>
-                <a:ea typeface="Aptos" panose="020B0004020202020204" pitchFamily="34" charset="0"/>
-                <a:cs typeface="Times New Roman" panose="02020603050405020304" pitchFamily="18" charset="0"/>
-              </a:rPr>
-              <a:t> prompt: in the same style as you did previously, write a section describing how to use the results of a standard curve. Standard curve is on a plate with results as MFI values from a multiplex bead assay. I want to use results from a standard curve to then convert international units to </a:t>
-            </a:r>
-            <a:r>
-              <a:rPr lang="en-US" sz="1200" kern="100" dirty="0" err="1">
-                <a:solidFill>
-                  <a:srgbClr val="000000"/>
-                </a:solidFill>
-                <a:effectLst/>
-                <a:latin typeface="Aptos" panose="020B0004020202020204" pitchFamily="34" charset="0"/>
-                <a:ea typeface="Aptos" panose="020B0004020202020204" pitchFamily="34" charset="0"/>
-                <a:cs typeface="Times New Roman" panose="02020603050405020304" pitchFamily="18" charset="0"/>
-              </a:rPr>
-              <a:t>mfi</a:t>
-            </a:r>
-            <a:r>
-              <a:rPr lang="en-US" sz="1200" kern="100" dirty="0">
-                <a:solidFill>
-                  <a:srgbClr val="000000"/>
-                </a:solidFill>
-                <a:effectLst/>
-                <a:latin typeface="Aptos" panose="020B0004020202020204" pitchFamily="34" charset="0"/>
-                <a:ea typeface="Aptos" panose="020B0004020202020204" pitchFamily="34" charset="0"/>
-                <a:cs typeface="Times New Roman" panose="02020603050405020304" pitchFamily="18" charset="0"/>
-              </a:rPr>
-              <a:t> to determine the cutoffs in a serological surveillance study.</a:t>
-            </a:r>
-            <a:endParaRPr lang="en-US" sz="1800" kern="100" dirty="0">
-              <a:effectLst/>
-              <a:latin typeface="Aptos" panose="020B0004020202020204" pitchFamily="34" charset="0"/>
-              <a:ea typeface="Aptos" panose="020B0004020202020204" pitchFamily="34" charset="0"/>
-              <a:cs typeface="Times New Roman" panose="02020603050405020304" pitchFamily="18" charset="0"/>
-            </a:endParaRPr>
-          </a:p>
-          <a:p>
-            <a:pPr marL="0" marR="0">
-              <a:lnSpc>
-                <a:spcPct val="115000"/>
-              </a:lnSpc>
-              <a:spcAft>
-                <a:spcPts val="800"/>
-              </a:spcAft>
-            </a:pPr>
-            <a:r>
-              <a:rPr lang="en-US" sz="1800" kern="100" dirty="0">
-                <a:effectLst/>
-                <a:latin typeface="Aptos" panose="020B0004020202020204" pitchFamily="34" charset="0"/>
-                <a:ea typeface="Aptos" panose="020B0004020202020204" pitchFamily="34" charset="0"/>
-                <a:cs typeface="Times New Roman" panose="02020603050405020304" pitchFamily="18" charset="0"/>
-              </a:rPr>
-              <a:t> </a:t>
-            </a:r>
-          </a:p>
-          <a:p>
             <a:endParaRPr lang="en-US" dirty="0"/>
           </a:p>
         </p:txBody>
@@ -3223,99 +1666,6 @@
           <a:bodyPr/>
           <a:lstStyle/>
           <a:p>
-            <a:pPr marL="342900" marR="0" lvl="0" indent="-342900">
-              <a:lnSpc>
-                <a:spcPct val="115000"/>
-              </a:lnSpc>
-              <a:buFont typeface="Symbol" pitchFamily="2" charset="2"/>
-              <a:buChar char=""/>
-            </a:pPr>
-            <a:r>
-              <a:rPr lang="en-US" sz="1200" kern="100" dirty="0">
-                <a:effectLst/>
-                <a:latin typeface="Aptos" panose="020B0004020202020204" pitchFamily="34" charset="0"/>
-                <a:ea typeface="Aptos" panose="020B0004020202020204" pitchFamily="34" charset="0"/>
-                <a:cs typeface="Times New Roman" panose="02020603050405020304" pitchFamily="18" charset="0"/>
-              </a:rPr>
-              <a:t>Interpretation of these numbers: ask participants what they think (5-10 min with discussion)</a:t>
-            </a:r>
-          </a:p>
-          <a:p>
-            <a:pPr marL="742950" marR="0" lvl="1" indent="-285750">
-              <a:lnSpc>
-                <a:spcPct val="115000"/>
-              </a:lnSpc>
-              <a:buFont typeface="Courier New" panose="02070309020205020404" pitchFamily="49" charset="0"/>
-              <a:buChar char="o"/>
-            </a:pPr>
-            <a:r>
-              <a:rPr lang="en-US" sz="1200" kern="100" dirty="0">
-                <a:effectLst/>
-                <a:latin typeface="Aptos" panose="020B0004020202020204" pitchFamily="34" charset="0"/>
-                <a:ea typeface="Aptos" panose="020B0004020202020204" pitchFamily="34" charset="0"/>
-                <a:cs typeface="Times New Roman" panose="02020603050405020304" pitchFamily="18" charset="0"/>
-              </a:rPr>
-              <a:t>Percentage of people who have been exposed to vaccine or natural infection</a:t>
-            </a:r>
-          </a:p>
-          <a:p>
-            <a:pPr marL="742950" marR="0" lvl="1" indent="-285750">
-              <a:lnSpc>
-                <a:spcPct val="115000"/>
-              </a:lnSpc>
-              <a:buFont typeface="Courier New" panose="02070309020205020404" pitchFamily="49" charset="0"/>
-              <a:buChar char="o"/>
-            </a:pPr>
-            <a:r>
-              <a:rPr lang="en-US" sz="1200" kern="100" dirty="0">
-                <a:effectLst/>
-                <a:latin typeface="Aptos" panose="020B0004020202020204" pitchFamily="34" charset="0"/>
-                <a:ea typeface="Aptos" panose="020B0004020202020204" pitchFamily="34" charset="0"/>
-                <a:cs typeface="Times New Roman" panose="02020603050405020304" pitchFamily="18" charset="0"/>
-              </a:rPr>
-              <a:t>How might interpretation change based on what we know about measles spread in region and spread of vaccination (</a:t>
-            </a:r>
-            <a:r>
-              <a:rPr lang="en-US" sz="1200" kern="100" dirty="0" err="1">
-                <a:effectLst/>
-                <a:latin typeface="Aptos" panose="020B0004020202020204" pitchFamily="34" charset="0"/>
-                <a:ea typeface="Aptos" panose="020B0004020202020204" pitchFamily="34" charset="0"/>
-                <a:cs typeface="Times New Roman" panose="02020603050405020304" pitchFamily="18" charset="0"/>
-              </a:rPr>
-              <a:t>eg</a:t>
-            </a:r>
-            <a:r>
-              <a:rPr lang="en-US" sz="1200" kern="100" dirty="0">
-                <a:effectLst/>
-                <a:latin typeface="Aptos" panose="020B0004020202020204" pitchFamily="34" charset="0"/>
-                <a:ea typeface="Aptos" panose="020B0004020202020204" pitchFamily="34" charset="0"/>
-                <a:cs typeface="Times New Roman" panose="02020603050405020304" pitchFamily="18" charset="0"/>
-              </a:rPr>
-              <a:t>, if there’s no/little vaccination in area, we could interpret seroprevalence as indication of spread of disease, and if there’s little evidence of disease in area, this is more indication of vaccination</a:t>
-            </a:r>
-          </a:p>
-          <a:p>
-            <a:pPr marL="742950" marR="0" lvl="1" indent="-285750">
-              <a:lnSpc>
-                <a:spcPct val="115000"/>
-              </a:lnSpc>
-              <a:spcAft>
-                <a:spcPts val="800"/>
-              </a:spcAft>
-              <a:buFont typeface="Courier New" panose="02070309020205020404" pitchFamily="49" charset="0"/>
-              <a:buChar char="o"/>
-            </a:pPr>
-            <a:r>
-              <a:rPr lang="en-US" sz="1200" kern="100" dirty="0">
-                <a:effectLst/>
-                <a:latin typeface="Aptos" panose="020B0004020202020204" pitchFamily="34" charset="0"/>
-                <a:ea typeface="Aptos" panose="020B0004020202020204" pitchFamily="34" charset="0"/>
-                <a:cs typeface="Times New Roman" panose="02020603050405020304" pitchFamily="18" charset="0"/>
-              </a:rPr>
-              <a:t>Cutoff is correlate as protection, so could also show which individuals are susceptible to future infection, and whether there could be outbreaks in region</a:t>
-            </a:r>
-          </a:p>
-          <a:p>
             <a:endParaRPr lang="en-US" dirty="0"/>
           </a:p>
         </p:txBody>
@@ -3406,99 +1756,6 @@
           <a:bodyPr/>
           <a:lstStyle/>
           <a:p>
-            <a:pPr marL="342900" marR="0" lvl="0" indent="-342900">
-              <a:lnSpc>
-                <a:spcPct val="115000"/>
-              </a:lnSpc>
-              <a:buFont typeface="Symbol" pitchFamily="2" charset="2"/>
-              <a:buChar char=""/>
-            </a:pPr>
-            <a:r>
-              <a:rPr lang="en-US" sz="1200" kern="100" dirty="0">
-                <a:effectLst/>
-                <a:latin typeface="Aptos" panose="020B0004020202020204" pitchFamily="34" charset="0"/>
-                <a:ea typeface="Aptos" panose="020B0004020202020204" pitchFamily="34" charset="0"/>
-                <a:cs typeface="Times New Roman" panose="02020603050405020304" pitchFamily="18" charset="0"/>
-              </a:rPr>
-              <a:t>Interpretation of these numbers: ask participants what they think (5-10 min with discussion)</a:t>
-            </a:r>
-          </a:p>
-          <a:p>
-            <a:pPr marL="742950" marR="0" lvl="1" indent="-285750">
-              <a:lnSpc>
-                <a:spcPct val="115000"/>
-              </a:lnSpc>
-              <a:buFont typeface="Courier New" panose="02070309020205020404" pitchFamily="49" charset="0"/>
-              <a:buChar char="o"/>
-            </a:pPr>
-            <a:r>
-              <a:rPr lang="en-US" sz="1200" kern="100" dirty="0">
-                <a:effectLst/>
-                <a:latin typeface="Aptos" panose="020B0004020202020204" pitchFamily="34" charset="0"/>
-                <a:ea typeface="Aptos" panose="020B0004020202020204" pitchFamily="34" charset="0"/>
-                <a:cs typeface="Times New Roman" panose="02020603050405020304" pitchFamily="18" charset="0"/>
-              </a:rPr>
-              <a:t>Percentage of people who have been exposed to vaccine or natural infection</a:t>
-            </a:r>
-          </a:p>
-          <a:p>
-            <a:pPr marL="742950" marR="0" lvl="1" indent="-285750">
-              <a:lnSpc>
-                <a:spcPct val="115000"/>
-              </a:lnSpc>
-              <a:buFont typeface="Courier New" panose="02070309020205020404" pitchFamily="49" charset="0"/>
-              <a:buChar char="o"/>
-            </a:pPr>
-            <a:r>
-              <a:rPr lang="en-US" sz="1200" kern="100" dirty="0">
-                <a:effectLst/>
-                <a:latin typeface="Aptos" panose="020B0004020202020204" pitchFamily="34" charset="0"/>
-                <a:ea typeface="Aptos" panose="020B0004020202020204" pitchFamily="34" charset="0"/>
-                <a:cs typeface="Times New Roman" panose="02020603050405020304" pitchFamily="18" charset="0"/>
-              </a:rPr>
-              <a:t>How might interpretation change based on what we know about measles spread in region and spread of vaccination (</a:t>
-            </a:r>
-            <a:r>
-              <a:rPr lang="en-US" sz="1200" kern="100" dirty="0" err="1">
-                <a:effectLst/>
-                <a:latin typeface="Aptos" panose="020B0004020202020204" pitchFamily="34" charset="0"/>
-                <a:ea typeface="Aptos" panose="020B0004020202020204" pitchFamily="34" charset="0"/>
-                <a:cs typeface="Times New Roman" panose="02020603050405020304" pitchFamily="18" charset="0"/>
-              </a:rPr>
-              <a:t>eg</a:t>
-            </a:r>
-            <a:r>
-              <a:rPr lang="en-US" sz="1200" kern="100" dirty="0">
-                <a:effectLst/>
-                <a:latin typeface="Aptos" panose="020B0004020202020204" pitchFamily="34" charset="0"/>
-                <a:ea typeface="Aptos" panose="020B0004020202020204" pitchFamily="34" charset="0"/>
-                <a:cs typeface="Times New Roman" panose="02020603050405020304" pitchFamily="18" charset="0"/>
-              </a:rPr>
-              <a:t>, if there’s no/little vaccination in area, we could interpret seroprevalence as indication of spread of disease, and if there’s little evidence of disease in area, this is more indication of vaccination</a:t>
-            </a:r>
-          </a:p>
-          <a:p>
-            <a:pPr marL="742950" marR="0" lvl="1" indent="-285750">
-              <a:lnSpc>
-                <a:spcPct val="115000"/>
-              </a:lnSpc>
-              <a:spcAft>
-                <a:spcPts val="800"/>
-              </a:spcAft>
-              <a:buFont typeface="Courier New" panose="02070309020205020404" pitchFamily="49" charset="0"/>
-              <a:buChar char="o"/>
-            </a:pPr>
-            <a:r>
-              <a:rPr lang="en-US" sz="1200" kern="100" dirty="0">
-                <a:effectLst/>
-                <a:latin typeface="Aptos" panose="020B0004020202020204" pitchFamily="34" charset="0"/>
-                <a:ea typeface="Aptos" panose="020B0004020202020204" pitchFamily="34" charset="0"/>
-                <a:cs typeface="Times New Roman" panose="02020603050405020304" pitchFamily="18" charset="0"/>
-              </a:rPr>
-              <a:t>Cutoff is correlate as protection, so could also show which individuals are susceptible to future infection, and whether there could be outbreaks in region</a:t>
-            </a:r>
-          </a:p>
-          <a:p>
             <a:endParaRPr lang="en-US" dirty="0"/>
           </a:p>
         </p:txBody>
@@ -3582,77 +1839,6 @@
         <p:txBody>
           <a:bodyPr/>
           <a:lstStyle/>
-          <a:p>
-            <a:pPr marL="342900" marR="0" lvl="0" indent="-342900">
-              <a:lnSpc>
-                <a:spcPct val="115000"/>
-              </a:lnSpc>
-              <a:buFont typeface="Symbol" pitchFamily="2" charset="2"/>
-              <a:buChar char=""/>
-            </a:pPr>
-            <a:endParaRPr lang="en-US" kern="100" dirty="0">
-              <a:latin typeface="Aptos" panose="020B0004020202020204" pitchFamily="34" charset="0"/>
-              <a:ea typeface="Aptos" panose="020B0004020202020204" pitchFamily="34" charset="0"/>
-              <a:cs typeface="Times New Roman" panose="02020603050405020304" pitchFamily="18" charset="0"/>
-            </a:endParaRPr>
-          </a:p>
-          <a:p>
-            <a:pPr marL="342900" marR="0" lvl="0" indent="-342900">
-              <a:lnSpc>
-                <a:spcPct val="115000"/>
-              </a:lnSpc>
-              <a:buFont typeface="Symbol" pitchFamily="2" charset="2"/>
-              <a:buChar char=""/>
-            </a:pPr>
-            <a:r>
-              <a:rPr lang="en-US" kern="100" dirty="0">
-                <a:effectLst/>
-                <a:latin typeface="Aptos" panose="020B0004020202020204" pitchFamily="34" charset="0"/>
-                <a:ea typeface="Aptos" panose="020B0004020202020204" pitchFamily="34" charset="0"/>
-                <a:cs typeface="Times New Roman" panose="02020603050405020304" pitchFamily="18" charset="0"/>
-              </a:rPr>
-              <a:t>Controls necessary for many cutoff methods (15 min)</a:t>
-            </a:r>
-          </a:p>
-          <a:p>
-            <a:pPr marL="742950" marR="0" lvl="1" indent="-285750">
-              <a:lnSpc>
-                <a:spcPct val="115000"/>
-              </a:lnSpc>
-              <a:buFont typeface="Courier New" panose="02070309020205020404" pitchFamily="49" charset="0"/>
-              <a:buChar char="o"/>
-            </a:pPr>
-            <a:r>
-              <a:rPr lang="en-US" sz="2800" kern="100" dirty="0">
-                <a:effectLst/>
-                <a:latin typeface="Aptos" panose="020B0004020202020204" pitchFamily="34" charset="0"/>
-                <a:ea typeface="Aptos" panose="020B0004020202020204" pitchFamily="34" charset="0"/>
-                <a:cs typeface="Times New Roman" panose="02020603050405020304" pitchFamily="18" charset="0"/>
-              </a:rPr>
-              <a:t>For most diseases, we don’t have a correlate of protection</a:t>
-            </a:r>
-          </a:p>
-          <a:p>
-            <a:pPr marL="742950" marR="0" lvl="1" indent="-285750">
-              <a:lnSpc>
-                <a:spcPct val="115000"/>
-              </a:lnSpc>
-              <a:spcAft>
-                <a:spcPts val="800"/>
-              </a:spcAft>
-              <a:buFont typeface="Courier New" panose="02070309020205020404" pitchFamily="49" charset="0"/>
-              <a:buChar char="o"/>
-            </a:pPr>
-            <a:r>
-              <a:rPr lang="en-US" sz="2800" kern="100" dirty="0">
-                <a:effectLst/>
-                <a:latin typeface="Aptos" panose="020B0004020202020204" pitchFamily="34" charset="0"/>
-                <a:ea typeface="Aptos" panose="020B0004020202020204" pitchFamily="34" charset="0"/>
-                <a:cs typeface="Times New Roman" panose="02020603050405020304" pitchFamily="18" charset="0"/>
-              </a:rPr>
-              <a:t>Seropositivity using different cutoffs may have different interpretations. Consider how to interpret seropositivity for the cutoff methods you apply.</a:t>
-            </a:r>
-          </a:p>
           <a:p>
             <a:endParaRPr lang="en-US" dirty="0"/>
           </a:p>
@@ -3930,99 +2116,6 @@
           <a:bodyPr/>
           <a:lstStyle/>
           <a:p>
-            <a:pPr marL="1600200" marR="0" lvl="3" indent="-228600">
-              <a:lnSpc>
-                <a:spcPct val="115000"/>
-              </a:lnSpc>
-              <a:buFont typeface="Symbol" pitchFamily="2" charset="2"/>
-              <a:buChar char=""/>
-            </a:pPr>
-            <a:r>
-              <a:rPr lang="en-US" sz="1200" kern="100" dirty="0">
-                <a:effectLst/>
-                <a:latin typeface="Aptos" panose="020B0004020202020204" pitchFamily="34" charset="0"/>
-                <a:ea typeface="Aptos" panose="020B0004020202020204" pitchFamily="34" charset="0"/>
-                <a:cs typeface="Times New Roman" panose="02020603050405020304" pitchFamily="18" charset="0"/>
-              </a:rPr>
-              <a:t>Ask trainees: What populations might be best to get negative controls from?</a:t>
-            </a:r>
-          </a:p>
-          <a:p>
-            <a:pPr marL="2057400" marR="0" lvl="4" indent="-228600">
-              <a:lnSpc>
-                <a:spcPct val="115000"/>
-              </a:lnSpc>
-              <a:buFont typeface="Courier New" panose="02070309020205020404" pitchFamily="49" charset="0"/>
-              <a:buChar char="o"/>
-            </a:pPr>
-            <a:r>
-              <a:rPr lang="en-US" sz="1200" kern="100" dirty="0">
-                <a:effectLst/>
-                <a:latin typeface="Aptos" panose="020B0004020202020204" pitchFamily="34" charset="0"/>
-                <a:ea typeface="Aptos" panose="020B0004020202020204" pitchFamily="34" charset="0"/>
-                <a:cs typeface="Times New Roman" panose="02020603050405020304" pitchFamily="18" charset="0"/>
-              </a:rPr>
-              <a:t>Non-endemic area (likely to be adults)</a:t>
-            </a:r>
-          </a:p>
-          <a:p>
-            <a:pPr marL="2057400" marR="0" lvl="4" indent="-228600">
-              <a:lnSpc>
-                <a:spcPct val="115000"/>
-              </a:lnSpc>
-              <a:buFont typeface="Courier New" panose="02070309020205020404" pitchFamily="49" charset="0"/>
-              <a:buChar char="o"/>
-            </a:pPr>
-            <a:r>
-              <a:rPr lang="en-US" sz="1200" kern="100" dirty="0">
-                <a:effectLst/>
-                <a:latin typeface="Aptos" panose="020B0004020202020204" pitchFamily="34" charset="0"/>
-                <a:ea typeface="Aptos" panose="020B0004020202020204" pitchFamily="34" charset="0"/>
-                <a:cs typeface="Times New Roman" panose="02020603050405020304" pitchFamily="18" charset="0"/>
-              </a:rPr>
-              <a:t>Very young presumed unexposed (likely to be from target population)</a:t>
-            </a:r>
-          </a:p>
-          <a:p>
-            <a:pPr marL="1600200" marR="0" lvl="3" indent="-228600">
-              <a:lnSpc>
-                <a:spcPct val="115000"/>
-              </a:lnSpc>
-              <a:buFont typeface="Symbol" pitchFamily="2" charset="2"/>
-              <a:buChar char=""/>
-            </a:pPr>
-            <a:r>
-              <a:rPr lang="en-US" sz="1200" kern="100" dirty="0">
-                <a:effectLst/>
-                <a:latin typeface="Aptos" panose="020B0004020202020204" pitchFamily="34" charset="0"/>
-                <a:ea typeface="Aptos" panose="020B0004020202020204" pitchFamily="34" charset="0"/>
-                <a:cs typeface="Times New Roman" panose="02020603050405020304" pitchFamily="18" charset="0"/>
-              </a:rPr>
-              <a:t>Discusses pros/cons of each of these. Idea that controls should be most similar to counterfactual exposed population that is otherwise exactly the same</a:t>
-            </a:r>
-          </a:p>
-          <a:p>
-            <a:pPr marL="1143000" marR="0" lvl="2" indent="-228600">
-              <a:lnSpc>
-                <a:spcPct val="115000"/>
-              </a:lnSpc>
-              <a:spcAft>
-                <a:spcPts val="800"/>
-              </a:spcAft>
-              <a:buFont typeface="Wingdings" pitchFamily="2" charset="2"/>
-              <a:buChar char=""/>
-            </a:pPr>
-            <a:r>
-              <a:rPr lang="en-US" sz="1200" kern="100" dirty="0">
-                <a:effectLst/>
-                <a:latin typeface="Aptos" panose="020B0004020202020204" pitchFamily="34" charset="0"/>
-                <a:ea typeface="Aptos" panose="020B0004020202020204" pitchFamily="34" charset="0"/>
-                <a:cs typeface="Times New Roman" panose="02020603050405020304" pitchFamily="18" charset="0"/>
-              </a:rPr>
-              <a:t>In practice, you may not have ideal controls and will make do with what you have</a:t>
-            </a:r>
-          </a:p>
-          <a:p>
             <a:endParaRPr lang="en-US" dirty="0"/>
           </a:p>
         </p:txBody>
@@ -4191,101 +2284,6 @@
           <a:bodyPr/>
           <a:lstStyle/>
           <a:p>
-            <a:r>
-              <a:rPr lang="en-US" b="0" i="0" dirty="0" err="1">
-                <a:solidFill>
-                  <a:srgbClr val="D1D2D3"/>
-                </a:solidFill>
-                <a:effectLst/>
-                <a:latin typeface="Slack-Lato"/>
-              </a:rPr>
-              <a:t>wruv</a:t>
-            </a:r>
-            <a:r>
-              <a:rPr lang="en-US" b="0" i="0" dirty="0">
-                <a:solidFill>
-                  <a:srgbClr val="D1D2D3"/>
-                </a:solidFill>
-                <a:effectLst/>
-                <a:latin typeface="Slack-Lato"/>
-              </a:rPr>
-              <a:t> (rubella) </a:t>
-            </a:r>
-            <a:endParaRPr lang="en-US" dirty="0"/>
-          </a:p>
-          <a:p>
-            <a:r>
-              <a:rPr lang="en-US" dirty="0" err="1"/>
-              <a:t>Wmev</a:t>
-            </a:r>
-            <a:r>
-              <a:rPr lang="en-US" dirty="0"/>
-              <a:t> = measles</a:t>
-            </a:r>
-          </a:p>
-          <a:p>
-            <a:r>
-              <a:rPr lang="en-US" dirty="0" err="1"/>
-              <a:t>Wruv</a:t>
-            </a:r>
-            <a:r>
-              <a:rPr lang="en-US" dirty="0"/>
-              <a:t> – 8 pt standard curve for lecture</a:t>
-            </a:r>
-          </a:p>
-          <a:p>
-            <a:r>
-              <a:rPr lang="en-US" dirty="0" err="1"/>
-              <a:t>Wmev</a:t>
-            </a:r>
-            <a:r>
-              <a:rPr lang="en-US" dirty="0"/>
-              <a:t> – 11 pt curve for lab</a:t>
-            </a:r>
-          </a:p>
-          <a:p>
-            <a:endParaRPr lang="en-US" dirty="0"/>
-          </a:p>
-          <a:p>
-            <a:r>
-              <a:rPr lang="en-US" dirty="0"/>
-              <a:t>Neg controls for: CSP, GLURPR2, JE3, AMA1, MSP119, WNV, YF, ZIKA</a:t>
-            </a:r>
-          </a:p>
-          <a:p>
-            <a:r>
-              <a:rPr lang="en-US" dirty="0"/>
-              <a:t>Missing controls for: CHIKV, DENV</a:t>
-            </a:r>
-          </a:p>
-          <a:p>
-            <a:r>
-              <a:rPr lang="en-US" dirty="0"/>
-              <a:t>St curves but no controls for: WRUV and WMEV</a:t>
-            </a:r>
-          </a:p>
-          <a:p>
-            <a:r>
-              <a:rPr lang="en-US" dirty="0"/>
-              <a:t>Control antigen SNAP</a:t>
-            </a:r>
-          </a:p>
-          <a:p>
-            <a:endParaRPr lang="en-US" dirty="0"/>
-          </a:p>
-          <a:p>
-            <a:r>
-              <a:rPr lang="en-US" dirty="0"/>
-              <a:t>For lecture-  remove antigens from plots: WMEV, JE3, CSP</a:t>
-            </a:r>
-          </a:p>
-          <a:p>
-            <a:r>
-              <a:rPr lang="en-US" dirty="0"/>
-              <a:t>Use these in lab: WMEV, JE3, CSP</a:t>
-            </a:r>
-          </a:p>
-          <a:p>
             <a:endParaRPr lang="en-US" dirty="0"/>
           </a:p>
         </p:txBody>
@@ -4369,45 +2367,6 @@
         <p:txBody>
           <a:bodyPr/>
           <a:lstStyle/>
-          <a:p>
-            <a:pPr marL="742950" marR="0" lvl="1" indent="-285750">
-              <a:lnSpc>
-                <a:spcPct val="115000"/>
-              </a:lnSpc>
-              <a:buFont typeface="Courier New" panose="02070309020205020404" pitchFamily="49" charset="0"/>
-              <a:buChar char="o"/>
-            </a:pPr>
-            <a:r>
-              <a:rPr lang="en-US" sz="1200" kern="100" dirty="0">
-                <a:effectLst/>
-                <a:latin typeface="Aptos" panose="020B0004020202020204" pitchFamily="34" charset="0"/>
-                <a:ea typeface="Aptos" panose="020B0004020202020204" pitchFamily="34" charset="0"/>
-                <a:cs typeface="Times New Roman" panose="02020603050405020304" pitchFamily="18" charset="0"/>
-              </a:rPr>
-              <a:t>Useful to look at overall distribution, see if there are patterns. Is there one peak or multiple peaks? Narrow or wide distribution? </a:t>
-            </a:r>
-          </a:p>
-          <a:p>
-            <a:pPr marL="742950" marR="0" lvl="1" indent="-285750">
-              <a:lnSpc>
-                <a:spcPct val="115000"/>
-              </a:lnSpc>
-              <a:spcAft>
-                <a:spcPts val="800"/>
-              </a:spcAft>
-              <a:buFont typeface="Courier New" panose="02070309020205020404" pitchFamily="49" charset="0"/>
-              <a:buChar char="o"/>
-            </a:pPr>
-            <a:r>
-              <a:rPr lang="en-US" sz="1200" kern="100" dirty="0">
-                <a:effectLst/>
-                <a:latin typeface="Aptos" panose="020B0004020202020204" pitchFamily="34" charset="0"/>
-                <a:ea typeface="Aptos" panose="020B0004020202020204" pitchFamily="34" charset="0"/>
-                <a:cs typeface="Times New Roman" panose="02020603050405020304" pitchFamily="18" charset="0"/>
-              </a:rPr>
-              <a:t>Also do common sense checks – strange outliers</a:t>
-            </a:r>
-          </a:p>
           <a:p>
             <a:endParaRPr lang="en-US" dirty="0"/>
           </a:p>
@@ -4619,60 +2578,6 @@
           <a:bodyPr/>
           <a:lstStyle/>
           <a:p>
-            <a:pPr marL="742950" marR="0" lvl="1" indent="-285750">
-              <a:lnSpc>
-                <a:spcPct val="115000"/>
-              </a:lnSpc>
-              <a:buFont typeface="Courier New" panose="02070309020205020404" pitchFamily="49" charset="0"/>
-              <a:buChar char="o"/>
-            </a:pPr>
-            <a:r>
-              <a:rPr lang="en-US" sz="1200" kern="100" dirty="0">
-                <a:effectLst/>
-                <a:latin typeface="Aptos" panose="020B0004020202020204" pitchFamily="34" charset="0"/>
-                <a:ea typeface="Aptos" panose="020B0004020202020204" pitchFamily="34" charset="0"/>
-                <a:cs typeface="Times New Roman" panose="02020603050405020304" pitchFamily="18" charset="0"/>
-              </a:rPr>
-              <a:t>What exposure patterns could lead to what distributions?</a:t>
-            </a:r>
-          </a:p>
-          <a:p>
-            <a:pPr marL="1143000" marR="0" lvl="2" indent="-228600">
-              <a:lnSpc>
-                <a:spcPct val="115000"/>
-              </a:lnSpc>
-              <a:buFont typeface="Wingdings" pitchFamily="2" charset="2"/>
-              <a:buChar char=""/>
-            </a:pPr>
-            <a:r>
-              <a:rPr lang="en-US" sz="1200" kern="100" dirty="0">
-                <a:effectLst/>
-                <a:latin typeface="Aptos" panose="020B0004020202020204" pitchFamily="34" charset="0"/>
-                <a:ea typeface="Aptos" panose="020B0004020202020204" pitchFamily="34" charset="0"/>
-                <a:cs typeface="Times New Roman" panose="02020603050405020304" pitchFamily="18" charset="0"/>
-              </a:rPr>
-              <a:t>Could see a bimodal distribution if there is a mix of exposed and unexposed in population</a:t>
-            </a:r>
-          </a:p>
-          <a:p>
-            <a:pPr marL="1143000" marR="0" lvl="2" indent="-228600">
-              <a:lnSpc>
-                <a:spcPct val="115000"/>
-              </a:lnSpc>
-              <a:buFont typeface="Wingdings" pitchFamily="2" charset="2"/>
-              <a:buChar char=""/>
-            </a:pPr>
-            <a:r>
-              <a:rPr lang="en-US" sz="1200" kern="100" dirty="0">
-                <a:effectLst/>
-                <a:latin typeface="Aptos" panose="020B0004020202020204" pitchFamily="34" charset="0"/>
-                <a:ea typeface="Aptos" panose="020B0004020202020204" pitchFamily="34" charset="0"/>
-                <a:cs typeface="Times New Roman" panose="02020603050405020304" pitchFamily="18" charset="0"/>
-              </a:rPr>
-              <a:t>Could see unimodal distribution if most people get exposed but have waning antibodies, or if exposure without symptomatic infection could lead to smaller immune response. Does vaccine vs. natural infection elicit different responses?</a:t>
-            </a:r>
-          </a:p>
-          <a:p>
             <a:pPr marL="1143000" marR="0" lvl="2" indent="-228600">
               <a:lnSpc>
                 <a:spcPct val="115000"/>
@@ -4777,130 +2682,6 @@
         <p:txBody>
           <a:bodyPr/>
           <a:lstStyle/>
-          <a:p>
-            <a:pPr marL="0" marR="0" lvl="0" indent="0" algn="l" defTabSz="914400" rtl="0" eaLnBrk="1" fontAlgn="auto" latinLnBrk="0" hangingPunct="1">
-              <a:lnSpc>
-                <a:spcPct val="100000"/>
-              </a:lnSpc>
-              <a:spcBef>
-                <a:spcPts val="0"/>
-              </a:spcBef>
-              <a:spcAft>
-                <a:spcPts val="0"/>
-              </a:spcAft>
-              <a:buClrTx/>
-              <a:buSzTx/>
-              <a:buFontTx/>
-              <a:buNone/>
-              <a:tabLst/>
-              <a:defRPr/>
-            </a:pPr>
-            <a:r>
-              <a:rPr lang="en-US" sz="1800" b="0" i="0" dirty="0" err="1">
-                <a:solidFill>
-                  <a:srgbClr val="D1D2D3"/>
-                </a:solidFill>
-                <a:effectLst/>
-                <a:latin typeface="Slack-Lato"/>
-              </a:rPr>
-              <a:t>wruv</a:t>
-            </a:r>
-            <a:r>
-              <a:rPr lang="en-US" sz="1800" b="0" i="0" dirty="0">
-                <a:solidFill>
-                  <a:srgbClr val="D1D2D3"/>
-                </a:solidFill>
-                <a:effectLst/>
-                <a:latin typeface="Slack-Lato"/>
-              </a:rPr>
-              <a:t> (rubella) </a:t>
-            </a:r>
-            <a:endParaRPr lang="en-US" sz="1800" dirty="0"/>
-          </a:p>
-          <a:p>
-            <a:endParaRPr lang="en-US" sz="1800" kern="100" dirty="0">
-              <a:effectLst/>
-              <a:latin typeface="Aptos" panose="020B0004020202020204" pitchFamily="34" charset="0"/>
-              <a:ea typeface="Aptos" panose="020B0004020202020204" pitchFamily="34" charset="0"/>
-              <a:cs typeface="Times New Roman" panose="02020603050405020304" pitchFamily="18" charset="0"/>
-            </a:endParaRPr>
-          </a:p>
-          <a:p>
-            <a:endParaRPr lang="en-US" sz="1800" kern="100" dirty="0">
-              <a:effectLst/>
-              <a:latin typeface="Aptos" panose="020B0004020202020204" pitchFamily="34" charset="0"/>
-              <a:ea typeface="Aptos" panose="020B0004020202020204" pitchFamily="34" charset="0"/>
-              <a:cs typeface="Times New Roman" panose="02020603050405020304" pitchFamily="18" charset="0"/>
-            </a:endParaRPr>
-          </a:p>
-          <a:p>
-            <a:r>
-              <a:rPr lang="en-US" sz="1800" kern="100" dirty="0">
-                <a:effectLst/>
-                <a:latin typeface="Aptos" panose="020B0004020202020204" pitchFamily="34" charset="0"/>
-                <a:ea typeface="Aptos" panose="020B0004020202020204" pitchFamily="34" charset="0"/>
-                <a:cs typeface="Times New Roman" panose="02020603050405020304" pitchFamily="18" charset="0"/>
-              </a:rPr>
-              <a:t>Motivation and discuss how binarizing data can be useful to interpret a lot of information (5 min):</a:t>
-            </a:r>
-          </a:p>
-          <a:p>
-            <a:pPr marL="742950" marR="0" lvl="1" indent="-285750">
-              <a:lnSpc>
-                <a:spcPct val="115000"/>
-              </a:lnSpc>
-              <a:buFont typeface="Courier New" panose="02070309020205020404" pitchFamily="49" charset="0"/>
-              <a:buChar char="o"/>
-            </a:pPr>
-            <a:r>
-              <a:rPr lang="en-US" sz="1800" kern="100" dirty="0">
-                <a:effectLst/>
-                <a:latin typeface="Aptos" panose="020B0004020202020204" pitchFamily="34" charset="0"/>
-                <a:ea typeface="Aptos" panose="020B0004020202020204" pitchFamily="34" charset="0"/>
-                <a:cs typeface="Times New Roman" panose="02020603050405020304" pitchFamily="18" charset="0"/>
-              </a:rPr>
-              <a:t>Example of Histogram of MFI from Measles </a:t>
-            </a:r>
-          </a:p>
-          <a:p>
-            <a:pPr marL="742950" marR="0" lvl="1" indent="-285750">
-              <a:lnSpc>
-                <a:spcPct val="115000"/>
-              </a:lnSpc>
-              <a:buFont typeface="Courier New" panose="02070309020205020404" pitchFamily="49" charset="0"/>
-              <a:buChar char="o"/>
-            </a:pPr>
-            <a:r>
-              <a:rPr lang="en-US" sz="1800" kern="100" dirty="0">
-                <a:effectLst/>
-                <a:latin typeface="Aptos" panose="020B0004020202020204" pitchFamily="34" charset="0"/>
-                <a:ea typeface="Aptos" panose="020B0004020202020204" pitchFamily="34" charset="0"/>
-                <a:cs typeface="Times New Roman" panose="02020603050405020304" pitchFamily="18" charset="0"/>
-              </a:rPr>
-              <a:t>Show multiple histograms together. How to synthesize lots of information at once? How to compare overall histograms?  </a:t>
-            </a:r>
-          </a:p>
-          <a:p>
-            <a:pPr marL="742950" marR="0" lvl="1" indent="-285750">
-              <a:lnSpc>
-                <a:spcPct val="115000"/>
-              </a:lnSpc>
-              <a:spcAft>
-                <a:spcPts val="800"/>
-              </a:spcAft>
-              <a:buFont typeface="Courier New" panose="02070309020205020404" pitchFamily="49" charset="0"/>
-              <a:buChar char="o"/>
-            </a:pPr>
-            <a:r>
-              <a:rPr lang="en-US" sz="1800" kern="100" dirty="0">
-                <a:effectLst/>
-                <a:latin typeface="Aptos" panose="020B0004020202020204" pitchFamily="34" charset="0"/>
-                <a:ea typeface="Aptos" panose="020B0004020202020204" pitchFamily="34" charset="0"/>
-                <a:cs typeface="Times New Roman" panose="02020603050405020304" pitchFamily="18" charset="0"/>
-              </a:rPr>
-              <a:t>Easier to look at information if binarize it</a:t>
-            </a:r>
-          </a:p>
           <a:p>
             <a:endParaRPr lang="en-US" dirty="0"/>
           </a:p>
@@ -5004,93 +2785,6 @@
           <a:bodyPr/>
           <a:lstStyle/>
           <a:p>
-            <a:r>
-              <a:rPr lang="en-US" sz="1800" kern="100" dirty="0">
-                <a:effectLst/>
-                <a:latin typeface="Aptos" panose="020B0004020202020204" pitchFamily="34" charset="0"/>
-                <a:ea typeface="Aptos" panose="020B0004020202020204" pitchFamily="34" charset="0"/>
-                <a:cs typeface="Times New Roman" panose="02020603050405020304" pitchFamily="18" charset="0"/>
-              </a:rPr>
-              <a:t>Seroprevalence = proportion of people protected from infection</a:t>
-            </a:r>
-          </a:p>
-          <a:p>
-            <a:endParaRPr lang="en-US" sz="1800" kern="100" dirty="0">
-              <a:effectLst/>
-              <a:latin typeface="Aptos" panose="020B0004020202020204" pitchFamily="34" charset="0"/>
-              <a:ea typeface="Aptos" panose="020B0004020202020204" pitchFamily="34" charset="0"/>
-              <a:cs typeface="Times New Roman" panose="02020603050405020304" pitchFamily="18" charset="0"/>
-            </a:endParaRPr>
-          </a:p>
-          <a:p>
-            <a:r>
-              <a:rPr lang="en-US" sz="1800" kern="100" dirty="0">
-                <a:effectLst/>
-                <a:latin typeface="Aptos" panose="020B0004020202020204" pitchFamily="34" charset="0"/>
-                <a:ea typeface="Aptos" panose="020B0004020202020204" pitchFamily="34" charset="0"/>
-                <a:cs typeface="Times New Roman" panose="02020603050405020304" pitchFamily="18" charset="0"/>
-              </a:rPr>
-              <a:t>Motivation and discuss how binarizing data can be useful to interpret a lot of information (5 min):</a:t>
-            </a:r>
-          </a:p>
-          <a:p>
-            <a:pPr marL="742950" marR="0" lvl="1" indent="-285750">
-              <a:lnSpc>
-                <a:spcPct val="115000"/>
-              </a:lnSpc>
-              <a:buFont typeface="Courier New" panose="02070309020205020404" pitchFamily="49" charset="0"/>
-              <a:buChar char="o"/>
-            </a:pPr>
-            <a:r>
-              <a:rPr lang="en-US" sz="1800" kern="100" dirty="0">
-                <a:effectLst/>
-                <a:latin typeface="Aptos" panose="020B0004020202020204" pitchFamily="34" charset="0"/>
-                <a:ea typeface="Aptos" panose="020B0004020202020204" pitchFamily="34" charset="0"/>
-                <a:cs typeface="Times New Roman" panose="02020603050405020304" pitchFamily="18" charset="0"/>
-              </a:rPr>
-              <a:t>Example of Histogram of MFI from Measles </a:t>
-            </a:r>
-          </a:p>
-          <a:p>
-            <a:pPr marL="742950" marR="0" lvl="1" indent="-285750">
-              <a:lnSpc>
-                <a:spcPct val="115000"/>
-              </a:lnSpc>
-              <a:buFont typeface="Courier New" panose="02070309020205020404" pitchFamily="49" charset="0"/>
-              <a:buChar char="o"/>
-            </a:pPr>
-            <a:r>
-              <a:rPr lang="en-US" sz="1800" kern="100" dirty="0">
-                <a:effectLst/>
-                <a:latin typeface="Aptos" panose="020B0004020202020204" pitchFamily="34" charset="0"/>
-                <a:ea typeface="Aptos" panose="020B0004020202020204" pitchFamily="34" charset="0"/>
-                <a:cs typeface="Times New Roman" panose="02020603050405020304" pitchFamily="18" charset="0"/>
-              </a:rPr>
-              <a:t>Show multiple histograms together. How to synthesize lots of information at once? How to compare overall histograms?  </a:t>
-            </a:r>
-          </a:p>
-          <a:p>
-            <a:pPr marL="742950" marR="0" lvl="1" indent="-285750">
-              <a:lnSpc>
-                <a:spcPct val="115000"/>
-              </a:lnSpc>
-              <a:spcAft>
-                <a:spcPts val="800"/>
-              </a:spcAft>
-              <a:buFont typeface="Courier New" panose="02070309020205020404" pitchFamily="49" charset="0"/>
-              <a:buChar char="o"/>
-            </a:pPr>
-            <a:r>
-              <a:rPr lang="en-US" sz="1800" kern="100" dirty="0">
-                <a:effectLst/>
-                <a:latin typeface="Aptos" panose="020B0004020202020204" pitchFamily="34" charset="0"/>
-                <a:ea typeface="Aptos" panose="020B0004020202020204" pitchFamily="34" charset="0"/>
-                <a:cs typeface="Times New Roman" panose="02020603050405020304" pitchFamily="18" charset="0"/>
-              </a:rPr>
-              <a:t>Easier to look at information if binarize it</a:t>
-            </a:r>
-          </a:p>
-          <a:p>
             <a:endParaRPr lang="en-US" dirty="0"/>
           </a:p>
         </p:txBody>
@@ -5198,74 +2892,6 @@
         <p:txBody>
           <a:bodyPr/>
           <a:lstStyle/>
-          <a:p>
-            <a:r>
-              <a:rPr lang="en-US" sz="1800" kern="100" dirty="0">
-                <a:effectLst/>
-                <a:latin typeface="Aptos" panose="020B0004020202020204" pitchFamily="34" charset="0"/>
-                <a:ea typeface="Aptos" panose="020B0004020202020204" pitchFamily="34" charset="0"/>
-                <a:cs typeface="Times New Roman" panose="02020603050405020304" pitchFamily="18" charset="0"/>
-              </a:rPr>
-              <a:t>Motivation and discuss how binarizing data can be useful to interpret a lot of information (5 min):</a:t>
-            </a:r>
-          </a:p>
-          <a:p>
-            <a:pPr marL="742950" marR="0" lvl="1" indent="-285750">
-              <a:lnSpc>
-                <a:spcPct val="115000"/>
-              </a:lnSpc>
-              <a:buFont typeface="Courier New" panose="02070309020205020404" pitchFamily="49" charset="0"/>
-              <a:buChar char="o"/>
-            </a:pPr>
-            <a:r>
-              <a:rPr lang="en-US" sz="1800" kern="100" dirty="0">
-                <a:effectLst/>
-                <a:latin typeface="Aptos" panose="020B0004020202020204" pitchFamily="34" charset="0"/>
-                <a:ea typeface="Aptos" panose="020B0004020202020204" pitchFamily="34" charset="0"/>
-                <a:cs typeface="Times New Roman" panose="02020603050405020304" pitchFamily="18" charset="0"/>
-              </a:rPr>
-              <a:t>Example of Histogram of MFI from Measles </a:t>
-            </a:r>
-          </a:p>
-          <a:p>
-            <a:pPr marL="742950" marR="0" lvl="1" indent="-285750">
-              <a:lnSpc>
-                <a:spcPct val="115000"/>
-              </a:lnSpc>
-              <a:buFont typeface="Courier New" panose="02070309020205020404" pitchFamily="49" charset="0"/>
-              <a:buChar char="o"/>
-            </a:pPr>
-            <a:r>
-              <a:rPr lang="en-US" sz="1800" kern="100" dirty="0">
-                <a:effectLst/>
-                <a:latin typeface="Aptos" panose="020B0004020202020204" pitchFamily="34" charset="0"/>
-                <a:ea typeface="Aptos" panose="020B0004020202020204" pitchFamily="34" charset="0"/>
-                <a:cs typeface="Times New Roman" panose="02020603050405020304" pitchFamily="18" charset="0"/>
-              </a:rPr>
-              <a:t>Show multiple histograms together. How to synthesize lots of information at once? How to compare overall histograms?  </a:t>
-            </a:r>
-          </a:p>
-          <a:p>
-            <a:pPr marL="742950" marR="0" lvl="1" indent="-285750">
-              <a:lnSpc>
-                <a:spcPct val="115000"/>
-              </a:lnSpc>
-              <a:spcAft>
-                <a:spcPts val="800"/>
-              </a:spcAft>
-              <a:buFont typeface="Courier New" panose="02070309020205020404" pitchFamily="49" charset="0"/>
-              <a:buChar char="o"/>
-            </a:pPr>
-            <a:r>
-              <a:rPr lang="en-US" sz="1800" kern="100" dirty="0">
-                <a:effectLst/>
-                <a:latin typeface="Aptos" panose="020B0004020202020204" pitchFamily="34" charset="0"/>
-                <a:ea typeface="Aptos" panose="020B0004020202020204" pitchFamily="34" charset="0"/>
-                <a:cs typeface="Times New Roman" panose="02020603050405020304" pitchFamily="18" charset="0"/>
-              </a:rPr>
-              <a:t>Easier to look at information if binarize it</a:t>
-            </a:r>
-          </a:p>
           <a:p>
             <a:endParaRPr lang="en-US" dirty="0"/>
           </a:p>

</xml_diff>